<commit_message>
Added unity-net installation to constructor     Added unity-net.sh and unity-net.service to assembler/payload/ Removed ValorEFSServer from Cloud-init and setup Added XenPVMBuilder to Cloud-init     Added setup_base_ubuntu_pvm.sh to install xen-tools and run xen-create-image         Added working sources.list and xm.tmpl as workaround for xen-create-image bugs on Xenblanket     Added setup_ubuntu_img() and setup_unity_img() to setup.py     Updated docs/design/assembly-and-provisioning.pptx Added basic multi-threading to setup.py. Now, up to three threads run at once.
</commit_message>
<xml_diff>
--- a/docs/design/assembly-and-provisioning.pptx
+++ b/docs/design/assembly-and-provisioning.pptx
@@ -5,19 +5,20 @@
     <p:sldMasterId id="2147483648" r:id="rId1"/>
   </p:sldMasterIdLst>
   <p:notesMasterIdLst>
-    <p:notesMasterId r:id="rId12"/>
+    <p:notesMasterId r:id="rId13"/>
   </p:notesMasterIdLst>
   <p:sldIdLst>
     <p:sldId id="257" r:id="rId2"/>
     <p:sldId id="264" r:id="rId3"/>
-    <p:sldId id="258" r:id="rId4"/>
-    <p:sldId id="261" r:id="rId5"/>
-    <p:sldId id="266" r:id="rId6"/>
-    <p:sldId id="265" r:id="rId7"/>
-    <p:sldId id="260" r:id="rId8"/>
-    <p:sldId id="262" r:id="rId9"/>
-    <p:sldId id="263" r:id="rId10"/>
-    <p:sldId id="256" r:id="rId11"/>
+    <p:sldId id="267" r:id="rId4"/>
+    <p:sldId id="258" r:id="rId5"/>
+    <p:sldId id="261" r:id="rId6"/>
+    <p:sldId id="266" r:id="rId7"/>
+    <p:sldId id="265" r:id="rId8"/>
+    <p:sldId id="260" r:id="rId9"/>
+    <p:sldId id="262" r:id="rId10"/>
+    <p:sldId id="263" r:id="rId11"/>
+    <p:sldId id="256" r:id="rId12"/>
   </p:sldIdLst>
   <p:sldSz cx="12192000" cy="6858000"/>
   <p:notesSz cx="6858000" cy="9144000"/>
@@ -123,6 +124,7 @@
           <p14:sldIdLst>
             <p14:sldId id="257"/>
             <p14:sldId id="264"/>
+            <p14:sldId id="267"/>
             <p14:sldId id="258"/>
             <p14:sldId id="261"/>
             <p14:sldId id="266"/>
@@ -228,7 +230,7 @@
           <a:p>
             <a:fld id="{0D81D3DF-B87A-48BC-9753-226BF6269B7F}" type="datetimeFigureOut">
               <a:rPr lang="en-US" smtClean="0"/>
-              <a:t>7/24/2018</a:t>
+              <a:t>9/18/2018</a:t>
             </a:fld>
             <a:endParaRPr lang="en-US"/>
           </a:p>
@@ -292,38 +294,37 @@
           <a:p>
             <a:pPr lvl="0"/>
             <a:r>
-              <a:rPr lang="en-US" smtClean="0"/>
+              <a:rPr lang="en-US"/>
               <a:t>Click to edit Master text styles</a:t>
             </a:r>
           </a:p>
           <a:p>
             <a:pPr lvl="1"/>
             <a:r>
-              <a:rPr lang="en-US" smtClean="0"/>
+              <a:rPr lang="en-US"/>
               <a:t>Second level</a:t>
             </a:r>
           </a:p>
           <a:p>
             <a:pPr lvl="2"/>
             <a:r>
-              <a:rPr lang="en-US" smtClean="0"/>
+              <a:rPr lang="en-US"/>
               <a:t>Third level</a:t>
             </a:r>
           </a:p>
           <a:p>
             <a:pPr lvl="3"/>
             <a:r>
-              <a:rPr lang="en-US" smtClean="0"/>
+              <a:rPr lang="en-US"/>
               <a:t>Fourth level</a:t>
             </a:r>
           </a:p>
           <a:p>
             <a:pPr lvl="4"/>
             <a:r>
-              <a:rPr lang="en-US" smtClean="0"/>
+              <a:rPr lang="en-US"/>
               <a:t>Fifth level</a:t>
             </a:r>
-            <a:endParaRPr lang="en-US"/>
           </a:p>
         </p:txBody>
       </p:sp>
@@ -541,22 +542,22 @@
           <a:lstStyle/>
           <a:p>
             <a:r>
-              <a:rPr lang="en-US" dirty="0" smtClean="0"/>
+              <a:rPr lang="en-US" dirty="0"/>
               <a:t>Orange</a:t>
             </a:r>
             <a:r>
-              <a:rPr lang="en-US" baseline="0" dirty="0" smtClean="0"/>
+              <a:rPr lang="en-US" baseline="0" dirty="0"/>
               <a:t> = Galahad </a:t>
             </a:r>
             <a:r>
-              <a:rPr lang="en-US" baseline="0" dirty="0" err="1" smtClean="0"/>
+              <a:rPr lang="en-US" baseline="0" dirty="0" err="1"/>
               <a:t>src</a:t>
             </a:r>
-            <a:endParaRPr lang="en-US" baseline="0" dirty="0" smtClean="0"/>
-          </a:p>
-          <a:p>
-            <a:r>
-              <a:rPr lang="en-US" baseline="0" dirty="0" smtClean="0"/>
+            <a:endParaRPr lang="en-US" baseline="0" dirty="0"/>
+          </a:p>
+          <a:p>
+            <a:r>
+              <a:rPr lang="en-US" baseline="0" dirty="0"/>
               <a:t>Blue = external dependency</a:t>
             </a:r>
           </a:p>
@@ -579,16 +580,16 @@
               <a:defRPr/>
             </a:pPr>
             <a:r>
-              <a:rPr lang="en-US" baseline="0" dirty="0" smtClean="0"/>
+              <a:rPr lang="en-US" baseline="0" dirty="0"/>
               <a:t>Green = constructed product</a:t>
             </a:r>
           </a:p>
           <a:p>
-            <a:endParaRPr lang="en-US" baseline="0" dirty="0" smtClean="0"/>
-          </a:p>
-          <a:p>
-            <a:r>
-              <a:rPr lang="en-US" baseline="0" dirty="0" smtClean="0"/>
+            <a:endParaRPr lang="en-US" baseline="0" dirty="0"/>
+          </a:p>
+          <a:p>
+            <a:r>
+              <a:rPr lang="en-US" baseline="0" dirty="0"/>
               <a:t>These two steps can be done by CI, by a release pipeline, or whatever other mechanism is appropriate, but the key point is that the things in green are </a:t>
             </a:r>
             <a:endParaRPr lang="en-US" dirty="0"/>
@@ -612,7 +613,7 @@
           <a:p>
             <a:fld id="{D632A65D-DB89-46C8-B3D7-7482880E4DD8}" type="slidenum">
               <a:rPr lang="en-US" smtClean="0"/>
-              <a:t>3</a:t>
+              <a:t>4</a:t>
             </a:fld>
             <a:endParaRPr lang="en-US"/>
           </a:p>
@@ -676,20 +677,20 @@
           <a:lstStyle/>
           <a:p>
             <a:r>
-              <a:rPr lang="en-US" dirty="0" smtClean="0"/>
+              <a:rPr lang="en-US" dirty="0"/>
               <a:t>The Valor steps are based on my best guess</a:t>
             </a:r>
             <a:r>
-              <a:rPr lang="en-US" baseline="0" dirty="0" smtClean="0"/>
+              <a:rPr lang="en-US" baseline="0" dirty="0"/>
               <a:t> understanding after reading through https://github.com/starlab-io/galahad-XenBlanket/tree/master/deploy</a:t>
             </a:r>
           </a:p>
           <a:p>
-            <a:endParaRPr lang="en-US" baseline="0" dirty="0" smtClean="0"/>
-          </a:p>
-          <a:p>
-            <a:r>
-              <a:rPr lang="en-US" baseline="0" dirty="0" smtClean="0"/>
+            <a:endParaRPr lang="en-US" baseline="0" dirty="0"/>
+          </a:p>
+          <a:p>
+            <a:r>
+              <a:rPr lang="en-US" baseline="0" dirty="0"/>
               <a:t>It doesn’t look like Excalibur is actually “built” by anything. The CI process seems to spin up a CloudFormation stack and then run the tests on the Excalibur instance that comes up with the stack. It appears to pull new Galahad code down on top of the Excalibur EC2 instance. This approach works for testing, but for building the final product, is not complete as it doesn’t build a new AMI, we’d have to make the source repo available to the deployed users, etc.</a:t>
             </a:r>
             <a:endParaRPr lang="en-US" dirty="0"/>
@@ -713,7 +714,7 @@
           <a:p>
             <a:fld id="{D632A65D-DB89-46C8-B3D7-7482880E4DD8}" type="slidenum">
               <a:rPr lang="en-US" smtClean="0"/>
-              <a:t>4</a:t>
+              <a:t>5</a:t>
             </a:fld>
             <a:endParaRPr lang="en-US"/>
           </a:p>
@@ -800,7 +801,7 @@
           <a:p>
             <a:fld id="{D632A65D-DB89-46C8-B3D7-7482880E4DD8}" type="slidenum">
               <a:rPr lang="en-US" smtClean="0"/>
-              <a:t>5</a:t>
+              <a:t>6</a:t>
             </a:fld>
             <a:endParaRPr lang="en-US"/>
           </a:p>
@@ -884,7 +885,7 @@
           <a:p>
             <a:fld id="{D632A65D-DB89-46C8-B3D7-7482880E4DD8}" type="slidenum">
               <a:rPr lang="en-US" smtClean="0"/>
-              <a:t>7</a:t>
+              <a:t>8</a:t>
             </a:fld>
             <a:endParaRPr lang="en-US"/>
           </a:p>
@@ -968,7 +969,7 @@
           <a:p>
             <a:fld id="{D632A65D-DB89-46C8-B3D7-7482880E4DD8}" type="slidenum">
               <a:rPr lang="en-US" smtClean="0"/>
-              <a:t>9</a:t>
+              <a:t>10</a:t>
             </a:fld>
             <a:endParaRPr lang="en-US"/>
           </a:p>
@@ -1032,11 +1033,11 @@
           <a:lstStyle/>
           <a:p>
             <a:r>
-              <a:rPr lang="en-US" dirty="0" smtClean="0"/>
+              <a:rPr lang="en-US" dirty="0"/>
               <a:t>Note that this is</a:t>
             </a:r>
             <a:r>
-              <a:rPr lang="en-US" baseline="0" dirty="0" smtClean="0"/>
+              <a:rPr lang="en-US" baseline="0" dirty="0"/>
               <a:t> what the current system does, and it’s wrong in a bunch of different ways. It is recorded here for posterity.</a:t>
             </a:r>
             <a:endParaRPr lang="en-US" dirty="0"/>
@@ -1060,7 +1061,7 @@
           <a:p>
             <a:fld id="{D632A65D-DB89-46C8-B3D7-7482880E4DD8}" type="slidenum">
               <a:rPr lang="en-US" smtClean="0"/>
-              <a:t>10</a:t>
+              <a:t>11</a:t>
             </a:fld>
             <a:endParaRPr lang="en-US"/>
           </a:p>
@@ -1121,10 +1122,9 @@
           </a:lstStyle>
           <a:p>
             <a:r>
-              <a:rPr lang="en-US" smtClean="0"/>
+              <a:rPr lang="en-US"/>
               <a:t>Click to edit Master title style</a:t>
             </a:r>
-            <a:endParaRPr lang="en-US"/>
           </a:p>
         </p:txBody>
       </p:sp>
@@ -1186,10 +1186,9 @@
           </a:lstStyle>
           <a:p>
             <a:r>
-              <a:rPr lang="en-US" smtClean="0"/>
+              <a:rPr lang="en-US"/>
               <a:t>Click to edit Master subtitle style</a:t>
             </a:r>
-            <a:endParaRPr lang="en-US"/>
           </a:p>
         </p:txBody>
       </p:sp>
@@ -1210,7 +1209,7 @@
           <a:p>
             <a:fld id="{CEF03615-30BE-4C87-AD99-0D4B01370BC6}" type="datetimeFigureOut">
               <a:rPr lang="en-US" smtClean="0"/>
-              <a:t>7/24/2018</a:t>
+              <a:t>9/18/2018</a:t>
             </a:fld>
             <a:endParaRPr lang="en-US"/>
           </a:p>
@@ -1304,10 +1303,9 @@
           <a:lstStyle/>
           <a:p>
             <a:r>
-              <a:rPr lang="en-US" smtClean="0"/>
+              <a:rPr lang="en-US"/>
               <a:t>Click to edit Master title style</a:t>
             </a:r>
-            <a:endParaRPr lang="en-US"/>
           </a:p>
         </p:txBody>
       </p:sp>
@@ -1328,38 +1326,37 @@
           <a:p>
             <a:pPr lvl="0"/>
             <a:r>
-              <a:rPr lang="en-US" smtClean="0"/>
+              <a:rPr lang="en-US"/>
               <a:t>Click to edit Master text styles</a:t>
             </a:r>
           </a:p>
           <a:p>
             <a:pPr lvl="1"/>
             <a:r>
-              <a:rPr lang="en-US" smtClean="0"/>
+              <a:rPr lang="en-US"/>
               <a:t>Second level</a:t>
             </a:r>
           </a:p>
           <a:p>
             <a:pPr lvl="2"/>
             <a:r>
-              <a:rPr lang="en-US" smtClean="0"/>
+              <a:rPr lang="en-US"/>
               <a:t>Third level</a:t>
             </a:r>
           </a:p>
           <a:p>
             <a:pPr lvl="3"/>
             <a:r>
-              <a:rPr lang="en-US" smtClean="0"/>
+              <a:rPr lang="en-US"/>
               <a:t>Fourth level</a:t>
             </a:r>
           </a:p>
           <a:p>
             <a:pPr lvl="4"/>
             <a:r>
-              <a:rPr lang="en-US" smtClean="0"/>
+              <a:rPr lang="en-US"/>
               <a:t>Fifth level</a:t>
             </a:r>
-            <a:endParaRPr lang="en-US"/>
           </a:p>
         </p:txBody>
       </p:sp>
@@ -1380,7 +1377,7 @@
           <a:p>
             <a:fld id="{CEF03615-30BE-4C87-AD99-0D4B01370BC6}" type="datetimeFigureOut">
               <a:rPr lang="en-US" smtClean="0"/>
-              <a:t>7/24/2018</a:t>
+              <a:t>9/18/2018</a:t>
             </a:fld>
             <a:endParaRPr lang="en-US"/>
           </a:p>
@@ -1479,10 +1476,9 @@
           <a:lstStyle/>
           <a:p>
             <a:r>
-              <a:rPr lang="en-US" smtClean="0"/>
+              <a:rPr lang="en-US"/>
               <a:t>Click to edit Master title style</a:t>
             </a:r>
-            <a:endParaRPr lang="en-US"/>
           </a:p>
         </p:txBody>
       </p:sp>
@@ -1508,38 +1504,37 @@
           <a:p>
             <a:pPr lvl="0"/>
             <a:r>
-              <a:rPr lang="en-US" smtClean="0"/>
+              <a:rPr lang="en-US"/>
               <a:t>Click to edit Master text styles</a:t>
             </a:r>
           </a:p>
           <a:p>
             <a:pPr lvl="1"/>
             <a:r>
-              <a:rPr lang="en-US" smtClean="0"/>
+              <a:rPr lang="en-US"/>
               <a:t>Second level</a:t>
             </a:r>
           </a:p>
           <a:p>
             <a:pPr lvl="2"/>
             <a:r>
-              <a:rPr lang="en-US" smtClean="0"/>
+              <a:rPr lang="en-US"/>
               <a:t>Third level</a:t>
             </a:r>
           </a:p>
           <a:p>
             <a:pPr lvl="3"/>
             <a:r>
-              <a:rPr lang="en-US" smtClean="0"/>
+              <a:rPr lang="en-US"/>
               <a:t>Fourth level</a:t>
             </a:r>
           </a:p>
           <a:p>
             <a:pPr lvl="4"/>
             <a:r>
-              <a:rPr lang="en-US" smtClean="0"/>
+              <a:rPr lang="en-US"/>
               <a:t>Fifth level</a:t>
             </a:r>
-            <a:endParaRPr lang="en-US"/>
           </a:p>
         </p:txBody>
       </p:sp>
@@ -1560,7 +1555,7 @@
           <a:p>
             <a:fld id="{CEF03615-30BE-4C87-AD99-0D4B01370BC6}" type="datetimeFigureOut">
               <a:rPr lang="en-US" smtClean="0"/>
-              <a:t>7/24/2018</a:t>
+              <a:t>9/18/2018</a:t>
             </a:fld>
             <a:endParaRPr lang="en-US"/>
           </a:p>
@@ -1654,10 +1649,9 @@
           <a:lstStyle/>
           <a:p>
             <a:r>
-              <a:rPr lang="en-US" smtClean="0"/>
+              <a:rPr lang="en-US"/>
               <a:t>Click to edit Master title style</a:t>
             </a:r>
-            <a:endParaRPr lang="en-US"/>
           </a:p>
         </p:txBody>
       </p:sp>
@@ -1678,38 +1672,37 @@
           <a:p>
             <a:pPr lvl="0"/>
             <a:r>
-              <a:rPr lang="en-US" smtClean="0"/>
+              <a:rPr lang="en-US"/>
               <a:t>Click to edit Master text styles</a:t>
             </a:r>
           </a:p>
           <a:p>
             <a:pPr lvl="1"/>
             <a:r>
-              <a:rPr lang="en-US" smtClean="0"/>
+              <a:rPr lang="en-US"/>
               <a:t>Second level</a:t>
             </a:r>
           </a:p>
           <a:p>
             <a:pPr lvl="2"/>
             <a:r>
-              <a:rPr lang="en-US" smtClean="0"/>
+              <a:rPr lang="en-US"/>
               <a:t>Third level</a:t>
             </a:r>
           </a:p>
           <a:p>
             <a:pPr lvl="3"/>
             <a:r>
-              <a:rPr lang="en-US" smtClean="0"/>
+              <a:rPr lang="en-US"/>
               <a:t>Fourth level</a:t>
             </a:r>
           </a:p>
           <a:p>
             <a:pPr lvl="4"/>
             <a:r>
-              <a:rPr lang="en-US" smtClean="0"/>
+              <a:rPr lang="en-US"/>
               <a:t>Fifth level</a:t>
             </a:r>
-            <a:endParaRPr lang="en-US"/>
           </a:p>
         </p:txBody>
       </p:sp>
@@ -1730,7 +1723,7 @@
           <a:p>
             <a:fld id="{CEF03615-30BE-4C87-AD99-0D4B01370BC6}" type="datetimeFigureOut">
               <a:rPr lang="en-US" smtClean="0"/>
-              <a:t>7/24/2018</a:t>
+              <a:t>9/18/2018</a:t>
             </a:fld>
             <a:endParaRPr lang="en-US"/>
           </a:p>
@@ -1833,10 +1826,9 @@
           </a:lstStyle>
           <a:p>
             <a:r>
-              <a:rPr lang="en-US" smtClean="0"/>
+              <a:rPr lang="en-US"/>
               <a:t>Click to edit Master title style</a:t>
             </a:r>
-            <a:endParaRPr lang="en-US"/>
           </a:p>
         </p:txBody>
       </p:sp>
@@ -1953,7 +1945,7 @@
           <a:p>
             <a:pPr lvl="0"/>
             <a:r>
-              <a:rPr lang="en-US" smtClean="0"/>
+              <a:rPr lang="en-US"/>
               <a:t>Click to edit Master text styles</a:t>
             </a:r>
           </a:p>
@@ -1976,7 +1968,7 @@
           <a:p>
             <a:fld id="{CEF03615-30BE-4C87-AD99-0D4B01370BC6}" type="datetimeFigureOut">
               <a:rPr lang="en-US" smtClean="0"/>
-              <a:t>7/24/2018</a:t>
+              <a:t>9/18/2018</a:t>
             </a:fld>
             <a:endParaRPr lang="en-US"/>
           </a:p>
@@ -2070,10 +2062,9 @@
           <a:lstStyle/>
           <a:p>
             <a:r>
-              <a:rPr lang="en-US" smtClean="0"/>
+              <a:rPr lang="en-US"/>
               <a:t>Click to edit Master title style</a:t>
             </a:r>
-            <a:endParaRPr lang="en-US"/>
           </a:p>
         </p:txBody>
       </p:sp>
@@ -2099,38 +2090,37 @@
           <a:p>
             <a:pPr lvl="0"/>
             <a:r>
-              <a:rPr lang="en-US" smtClean="0"/>
+              <a:rPr lang="en-US"/>
               <a:t>Click to edit Master text styles</a:t>
             </a:r>
           </a:p>
           <a:p>
             <a:pPr lvl="1"/>
             <a:r>
-              <a:rPr lang="en-US" smtClean="0"/>
+              <a:rPr lang="en-US"/>
               <a:t>Second level</a:t>
             </a:r>
           </a:p>
           <a:p>
             <a:pPr lvl="2"/>
             <a:r>
-              <a:rPr lang="en-US" smtClean="0"/>
+              <a:rPr lang="en-US"/>
               <a:t>Third level</a:t>
             </a:r>
           </a:p>
           <a:p>
             <a:pPr lvl="3"/>
             <a:r>
-              <a:rPr lang="en-US" smtClean="0"/>
+              <a:rPr lang="en-US"/>
               <a:t>Fourth level</a:t>
             </a:r>
           </a:p>
           <a:p>
             <a:pPr lvl="4"/>
             <a:r>
-              <a:rPr lang="en-US" smtClean="0"/>
+              <a:rPr lang="en-US"/>
               <a:t>Fifth level</a:t>
             </a:r>
-            <a:endParaRPr lang="en-US"/>
           </a:p>
         </p:txBody>
       </p:sp>
@@ -2156,38 +2146,37 @@
           <a:p>
             <a:pPr lvl="0"/>
             <a:r>
-              <a:rPr lang="en-US" smtClean="0"/>
+              <a:rPr lang="en-US"/>
               <a:t>Click to edit Master text styles</a:t>
             </a:r>
           </a:p>
           <a:p>
             <a:pPr lvl="1"/>
             <a:r>
-              <a:rPr lang="en-US" smtClean="0"/>
+              <a:rPr lang="en-US"/>
               <a:t>Second level</a:t>
             </a:r>
           </a:p>
           <a:p>
             <a:pPr lvl="2"/>
             <a:r>
-              <a:rPr lang="en-US" smtClean="0"/>
+              <a:rPr lang="en-US"/>
               <a:t>Third level</a:t>
             </a:r>
           </a:p>
           <a:p>
             <a:pPr lvl="3"/>
             <a:r>
-              <a:rPr lang="en-US" smtClean="0"/>
+              <a:rPr lang="en-US"/>
               <a:t>Fourth level</a:t>
             </a:r>
           </a:p>
           <a:p>
             <a:pPr lvl="4"/>
             <a:r>
-              <a:rPr lang="en-US" smtClean="0"/>
+              <a:rPr lang="en-US"/>
               <a:t>Fifth level</a:t>
             </a:r>
-            <a:endParaRPr lang="en-US"/>
           </a:p>
         </p:txBody>
       </p:sp>
@@ -2208,7 +2197,7 @@
           <a:p>
             <a:fld id="{CEF03615-30BE-4C87-AD99-0D4B01370BC6}" type="datetimeFigureOut">
               <a:rPr lang="en-US" smtClean="0"/>
-              <a:t>7/24/2018</a:t>
+              <a:t>9/18/2018</a:t>
             </a:fld>
             <a:endParaRPr lang="en-US"/>
           </a:p>
@@ -2307,10 +2296,9 @@
           <a:lstStyle/>
           <a:p>
             <a:r>
-              <a:rPr lang="en-US" smtClean="0"/>
+              <a:rPr lang="en-US"/>
               <a:t>Click to edit Master title style</a:t>
             </a:r>
-            <a:endParaRPr lang="en-US"/>
           </a:p>
         </p:txBody>
       </p:sp>
@@ -2373,7 +2361,7 @@
           <a:p>
             <a:pPr lvl="0"/>
             <a:r>
-              <a:rPr lang="en-US" smtClean="0"/>
+              <a:rPr lang="en-US"/>
               <a:t>Click to edit Master text styles</a:t>
             </a:r>
           </a:p>
@@ -2401,38 +2389,37 @@
           <a:p>
             <a:pPr lvl="0"/>
             <a:r>
-              <a:rPr lang="en-US" smtClean="0"/>
+              <a:rPr lang="en-US"/>
               <a:t>Click to edit Master text styles</a:t>
             </a:r>
           </a:p>
           <a:p>
             <a:pPr lvl="1"/>
             <a:r>
-              <a:rPr lang="en-US" smtClean="0"/>
+              <a:rPr lang="en-US"/>
               <a:t>Second level</a:t>
             </a:r>
           </a:p>
           <a:p>
             <a:pPr lvl="2"/>
             <a:r>
-              <a:rPr lang="en-US" smtClean="0"/>
+              <a:rPr lang="en-US"/>
               <a:t>Third level</a:t>
             </a:r>
           </a:p>
           <a:p>
             <a:pPr lvl="3"/>
             <a:r>
-              <a:rPr lang="en-US" smtClean="0"/>
+              <a:rPr lang="en-US"/>
               <a:t>Fourth level</a:t>
             </a:r>
           </a:p>
           <a:p>
             <a:pPr lvl="4"/>
             <a:r>
-              <a:rPr lang="en-US" smtClean="0"/>
+              <a:rPr lang="en-US"/>
               <a:t>Fifth level</a:t>
             </a:r>
-            <a:endParaRPr lang="en-US"/>
           </a:p>
         </p:txBody>
       </p:sp>
@@ -2495,7 +2482,7 @@
           <a:p>
             <a:pPr lvl="0"/>
             <a:r>
-              <a:rPr lang="en-US" smtClean="0"/>
+              <a:rPr lang="en-US"/>
               <a:t>Click to edit Master text styles</a:t>
             </a:r>
           </a:p>
@@ -2523,38 +2510,37 @@
           <a:p>
             <a:pPr lvl="0"/>
             <a:r>
-              <a:rPr lang="en-US" smtClean="0"/>
+              <a:rPr lang="en-US"/>
               <a:t>Click to edit Master text styles</a:t>
             </a:r>
           </a:p>
           <a:p>
             <a:pPr lvl="1"/>
             <a:r>
-              <a:rPr lang="en-US" smtClean="0"/>
+              <a:rPr lang="en-US"/>
               <a:t>Second level</a:t>
             </a:r>
           </a:p>
           <a:p>
             <a:pPr lvl="2"/>
             <a:r>
-              <a:rPr lang="en-US" smtClean="0"/>
+              <a:rPr lang="en-US"/>
               <a:t>Third level</a:t>
             </a:r>
           </a:p>
           <a:p>
             <a:pPr lvl="3"/>
             <a:r>
-              <a:rPr lang="en-US" smtClean="0"/>
+              <a:rPr lang="en-US"/>
               <a:t>Fourth level</a:t>
             </a:r>
           </a:p>
           <a:p>
             <a:pPr lvl="4"/>
             <a:r>
-              <a:rPr lang="en-US" smtClean="0"/>
+              <a:rPr lang="en-US"/>
               <a:t>Fifth level</a:t>
             </a:r>
-            <a:endParaRPr lang="en-US"/>
           </a:p>
         </p:txBody>
       </p:sp>
@@ -2575,7 +2561,7 @@
           <a:p>
             <a:fld id="{CEF03615-30BE-4C87-AD99-0D4B01370BC6}" type="datetimeFigureOut">
               <a:rPr lang="en-US" smtClean="0"/>
-              <a:t>7/24/2018</a:t>
+              <a:t>9/18/2018</a:t>
             </a:fld>
             <a:endParaRPr lang="en-US"/>
           </a:p>
@@ -2669,10 +2655,9 @@
           <a:lstStyle/>
           <a:p>
             <a:r>
-              <a:rPr lang="en-US" smtClean="0"/>
+              <a:rPr lang="en-US"/>
               <a:t>Click to edit Master title style</a:t>
             </a:r>
-            <a:endParaRPr lang="en-US"/>
           </a:p>
         </p:txBody>
       </p:sp>
@@ -2693,7 +2678,7 @@
           <a:p>
             <a:fld id="{CEF03615-30BE-4C87-AD99-0D4B01370BC6}" type="datetimeFigureOut">
               <a:rPr lang="en-US" smtClean="0"/>
-              <a:t>7/24/2018</a:t>
+              <a:t>9/18/2018</a:t>
             </a:fld>
             <a:endParaRPr lang="en-US"/>
           </a:p>
@@ -2788,7 +2773,7 @@
           <a:p>
             <a:fld id="{CEF03615-30BE-4C87-AD99-0D4B01370BC6}" type="datetimeFigureOut">
               <a:rPr lang="en-US" smtClean="0"/>
-              <a:t>7/24/2018</a:t>
+              <a:t>9/18/2018</a:t>
             </a:fld>
             <a:endParaRPr lang="en-US"/>
           </a:p>
@@ -2891,10 +2876,9 @@
           </a:lstStyle>
           <a:p>
             <a:r>
-              <a:rPr lang="en-US" smtClean="0"/>
+              <a:rPr lang="en-US"/>
               <a:t>Click to edit Master title style</a:t>
             </a:r>
-            <a:endParaRPr lang="en-US"/>
           </a:p>
         </p:txBody>
       </p:sp>
@@ -2948,38 +2932,37 @@
           <a:p>
             <a:pPr lvl="0"/>
             <a:r>
-              <a:rPr lang="en-US" smtClean="0"/>
+              <a:rPr lang="en-US"/>
               <a:t>Click to edit Master text styles</a:t>
             </a:r>
           </a:p>
           <a:p>
             <a:pPr lvl="1"/>
             <a:r>
-              <a:rPr lang="en-US" smtClean="0"/>
+              <a:rPr lang="en-US"/>
               <a:t>Second level</a:t>
             </a:r>
           </a:p>
           <a:p>
             <a:pPr lvl="2"/>
             <a:r>
-              <a:rPr lang="en-US" smtClean="0"/>
+              <a:rPr lang="en-US"/>
               <a:t>Third level</a:t>
             </a:r>
           </a:p>
           <a:p>
             <a:pPr lvl="3"/>
             <a:r>
-              <a:rPr lang="en-US" smtClean="0"/>
+              <a:rPr lang="en-US"/>
               <a:t>Fourth level</a:t>
             </a:r>
           </a:p>
           <a:p>
             <a:pPr lvl="4"/>
             <a:r>
-              <a:rPr lang="en-US" smtClean="0"/>
+              <a:rPr lang="en-US"/>
               <a:t>Fifth level</a:t>
             </a:r>
-            <a:endParaRPr lang="en-US"/>
           </a:p>
         </p:txBody>
       </p:sp>
@@ -3042,7 +3025,7 @@
           <a:p>
             <a:pPr lvl="0"/>
             <a:r>
-              <a:rPr lang="en-US" smtClean="0"/>
+              <a:rPr lang="en-US"/>
               <a:t>Click to edit Master text styles</a:t>
             </a:r>
           </a:p>
@@ -3065,7 +3048,7 @@
           <a:p>
             <a:fld id="{CEF03615-30BE-4C87-AD99-0D4B01370BC6}" type="datetimeFigureOut">
               <a:rPr lang="en-US" smtClean="0"/>
-              <a:t>7/24/2018</a:t>
+              <a:t>9/18/2018</a:t>
             </a:fld>
             <a:endParaRPr lang="en-US"/>
           </a:p>
@@ -3168,10 +3151,9 @@
           </a:lstStyle>
           <a:p>
             <a:r>
-              <a:rPr lang="en-US" smtClean="0"/>
+              <a:rPr lang="en-US"/>
               <a:t>Click to edit Master title style</a:t>
             </a:r>
-            <a:endParaRPr lang="en-US"/>
           </a:p>
         </p:txBody>
       </p:sp>
@@ -3295,7 +3277,7 @@
           <a:p>
             <a:pPr lvl="0"/>
             <a:r>
-              <a:rPr lang="en-US" smtClean="0"/>
+              <a:rPr lang="en-US"/>
               <a:t>Click to edit Master text styles</a:t>
             </a:r>
           </a:p>
@@ -3318,7 +3300,7 @@
           <a:p>
             <a:fld id="{CEF03615-30BE-4C87-AD99-0D4B01370BC6}" type="datetimeFigureOut">
               <a:rPr lang="en-US" smtClean="0"/>
-              <a:t>7/24/2018</a:t>
+              <a:t>9/18/2018</a:t>
             </a:fld>
             <a:endParaRPr lang="en-US"/>
           </a:p>
@@ -3427,10 +3409,9 @@
           <a:lstStyle/>
           <a:p>
             <a:r>
-              <a:rPr lang="en-US" smtClean="0"/>
+              <a:rPr lang="en-US"/>
               <a:t>Click to edit Master title style</a:t>
             </a:r>
-            <a:endParaRPr lang="en-US"/>
           </a:p>
         </p:txBody>
       </p:sp>
@@ -3461,38 +3442,37 @@
           <a:p>
             <a:pPr lvl="0"/>
             <a:r>
-              <a:rPr lang="en-US" smtClean="0"/>
+              <a:rPr lang="en-US"/>
               <a:t>Click to edit Master text styles</a:t>
             </a:r>
           </a:p>
           <a:p>
             <a:pPr lvl="1"/>
             <a:r>
-              <a:rPr lang="en-US" smtClean="0"/>
+              <a:rPr lang="en-US"/>
               <a:t>Second level</a:t>
             </a:r>
           </a:p>
           <a:p>
             <a:pPr lvl="2"/>
             <a:r>
-              <a:rPr lang="en-US" smtClean="0"/>
+              <a:rPr lang="en-US"/>
               <a:t>Third level</a:t>
             </a:r>
           </a:p>
           <a:p>
             <a:pPr lvl="3"/>
             <a:r>
-              <a:rPr lang="en-US" smtClean="0"/>
+              <a:rPr lang="en-US"/>
               <a:t>Fourth level</a:t>
             </a:r>
           </a:p>
           <a:p>
             <a:pPr lvl="4"/>
             <a:r>
-              <a:rPr lang="en-US" smtClean="0"/>
+              <a:rPr lang="en-US"/>
               <a:t>Fifth level</a:t>
             </a:r>
-            <a:endParaRPr lang="en-US"/>
           </a:p>
         </p:txBody>
       </p:sp>
@@ -3531,7 +3511,7 @@
           <a:p>
             <a:fld id="{CEF03615-30BE-4C87-AD99-0D4B01370BC6}" type="datetimeFigureOut">
               <a:rPr lang="en-US" smtClean="0"/>
-              <a:t>7/24/2018</a:t>
+              <a:t>9/18/2018</a:t>
             </a:fld>
             <a:endParaRPr lang="en-US"/>
           </a:p>
@@ -3952,10 +3932,9 @@
           <a:lstStyle/>
           <a:p>
             <a:r>
-              <a:rPr lang="en-US" dirty="0" smtClean="0"/>
+              <a:rPr lang="en-US" dirty="0"/>
               <a:t>Assembly, Provisioning, and Administrative Workflows</a:t>
             </a:r>
-            <a:endParaRPr lang="en-US" dirty="0"/>
           </a:p>
         </p:txBody>
       </p:sp>
@@ -3971,11 +3950,13 @@
         </p:nvSpPr>
         <p:spPr/>
         <p:txBody>
-          <a:bodyPr/>
-          <a:lstStyle/>
-          <a:p>
-            <a:r>
-              <a:rPr lang="en-US" sz="6600" dirty="0" smtClean="0">
+          <a:bodyPr vert="horz" lIns="91440" tIns="45720" rIns="91440" bIns="45720" rtlCol="0" anchor="t">
+            <a:normAutofit/>
+          </a:bodyPr>
+          <a:lstStyle/>
+          <a:p>
+            <a:r>
+              <a:rPr lang="en-US" sz="6600" dirty="0">
                 <a:solidFill>
                   <a:srgbClr val="FF0000"/>
                 </a:solidFill>
@@ -3985,10 +3966,12 @@
           </a:p>
           <a:p>
             <a:r>
-              <a:rPr lang="en-US" dirty="0" smtClean="0"/>
+              <a:rPr lang="en-US" dirty="0"/>
               <a:t>26 JUNE 2018</a:t>
             </a:r>
-            <a:endParaRPr lang="en-US" dirty="0"/>
+            <a:endParaRPr lang="en-US" dirty="0">
+              <a:cs typeface="Calibri"/>
+            </a:endParaRPr>
           </a:p>
         </p:txBody>
       </p:sp>
@@ -4024,6 +4007,178 @@
       </p:grpSpPr>
       <p:sp>
         <p:nvSpPr>
+          <p:cNvPr id="2" name="Title 1"/>
+          <p:cNvSpPr>
+            <a:spLocks noGrp="1"/>
+          </p:cNvSpPr>
+          <p:nvPr>
+            <p:ph type="title"/>
+          </p:nvPr>
+        </p:nvSpPr>
+        <p:spPr/>
+        <p:txBody>
+          <a:bodyPr/>
+          <a:lstStyle/>
+          <a:p>
+            <a:r>
+              <a:rPr lang="en-US" dirty="0"/>
+              <a:t>Modifications Proposed</a:t>
+            </a:r>
+          </a:p>
+        </p:txBody>
+      </p:sp>
+      <p:sp>
+        <p:nvSpPr>
+          <p:cNvPr id="3" name="Content Placeholder 2"/>
+          <p:cNvSpPr>
+            <a:spLocks noGrp="1"/>
+          </p:cNvSpPr>
+          <p:nvPr>
+            <p:ph idx="1"/>
+          </p:nvPr>
+        </p:nvSpPr>
+        <p:spPr/>
+        <p:txBody>
+          <a:bodyPr>
+            <a:normAutofit fontScale="85000" lnSpcReduction="20000"/>
+          </a:bodyPr>
+          <a:lstStyle/>
+          <a:p>
+            <a:r>
+              <a:rPr lang="en-US" dirty="0"/>
+              <a:t> Assembler needs to be overhauled</a:t>
+            </a:r>
+          </a:p>
+          <a:p>
+            <a:pPr lvl="1"/>
+            <a:r>
+              <a:rPr lang="en-US" dirty="0"/>
+              <a:t>Split into two parts:</a:t>
+            </a:r>
+          </a:p>
+          <a:p>
+            <a:pPr lvl="2"/>
+            <a:r>
+              <a:rPr lang="en-US" dirty="0"/>
+              <a:t>Construction</a:t>
+            </a:r>
+          </a:p>
+          <a:p>
+            <a:pPr lvl="3"/>
+            <a:r>
+              <a:rPr lang="en-US" dirty="0"/>
+              <a:t>Build base Unity image and push to EFS (?)</a:t>
+            </a:r>
+          </a:p>
+          <a:p>
+            <a:pPr lvl="3"/>
+            <a:r>
+              <a:rPr lang="en-US" dirty="0"/>
+              <a:t>Build Docker containers and push to CI or stable registry</a:t>
+            </a:r>
+          </a:p>
+          <a:p>
+            <a:pPr lvl="2"/>
+            <a:r>
+              <a:rPr lang="en-US" dirty="0"/>
+              <a:t>Assembly</a:t>
+            </a:r>
+          </a:p>
+          <a:p>
+            <a:pPr lvl="3"/>
+            <a:r>
+              <a:rPr lang="en-US" dirty="0"/>
+              <a:t>Build Virtue VM from base Unity image + Docker containers</a:t>
+            </a:r>
+          </a:p>
+          <a:p>
+            <a:pPr lvl="3"/>
+            <a:r>
+              <a:rPr lang="en-US" dirty="0"/>
+              <a:t>Store Virtue VM somewhere convenient (EFS?)</a:t>
+            </a:r>
+          </a:p>
+          <a:p>
+            <a:r>
+              <a:rPr lang="en-US" dirty="0"/>
+              <a:t>Need two different set of artifacts (Unity, Docker containers, Virtues)</a:t>
+            </a:r>
+          </a:p>
+          <a:p>
+            <a:pPr lvl="1"/>
+            <a:r>
+              <a:rPr lang="en-US" dirty="0"/>
+              <a:t>“stable” – this is the last tagged release that we expect to work</a:t>
+            </a:r>
+          </a:p>
+          <a:p>
+            <a:pPr lvl="1"/>
+            <a:r>
+              <a:rPr lang="en-US" dirty="0"/>
+              <a:t>“dev” – this is the bleeding edge, built by CI</a:t>
+            </a:r>
+          </a:p>
+          <a:p>
+            <a:r>
+              <a:rPr lang="en-US" dirty="0"/>
+              <a:t>Need to be able to mix stable and dev components during development</a:t>
+            </a:r>
+          </a:p>
+          <a:p>
+            <a:r>
+              <a:rPr lang="en-US" dirty="0"/>
+              <a:t>Need two different EFS stores – one for construction/assembly, and one for provisioning to </a:t>
+            </a:r>
+            <a:r>
+              <a:rPr lang="en-US" dirty="0" err="1"/>
+              <a:t>Valors</a:t>
+            </a:r>
+            <a:endParaRPr lang="en-US" dirty="0"/>
+          </a:p>
+          <a:p>
+            <a:r>
+              <a:rPr lang="en-US" dirty="0"/>
+              <a:t>Excalibur team is responsible for the provisioning workflow</a:t>
+            </a:r>
+          </a:p>
+          <a:p>
+            <a:pPr lvl="1"/>
+            <a:endParaRPr lang="en-US" dirty="0"/>
+          </a:p>
+        </p:txBody>
+      </p:sp>
+    </p:spTree>
+    <p:extLst>
+      <p:ext uri="{BB962C8B-B14F-4D97-AF65-F5344CB8AC3E}">
+        <p14:creationId xmlns:p14="http://schemas.microsoft.com/office/powerpoint/2010/main" val="3407547357"/>
+      </p:ext>
+    </p:extLst>
+  </p:cSld>
+  <p:clrMapOvr>
+    <a:masterClrMapping/>
+  </p:clrMapOvr>
+</p:sld>
+</file>
+
+<file path=ppt/slides/slide11.xml><?xml version="1.0" encoding="utf-8"?>
+<p:sld xmlns:a="http://schemas.openxmlformats.org/drawingml/2006/main" xmlns:r="http://schemas.openxmlformats.org/officeDocument/2006/relationships" xmlns:p="http://schemas.openxmlformats.org/presentationml/2006/main">
+  <p:cSld>
+    <p:spTree>
+      <p:nvGrpSpPr>
+        <p:cNvPr id="1" name=""/>
+        <p:cNvGrpSpPr/>
+        <p:nvPr/>
+      </p:nvGrpSpPr>
+      <p:grpSpPr>
+        <a:xfrm>
+          <a:off x="0" y="0"/>
+          <a:ext cx="0" cy="0"/>
+          <a:chOff x="0" y="0"/>
+          <a:chExt cx="0" cy="0"/>
+        </a:xfrm>
+      </p:grpSpPr>
+      <p:sp>
+        <p:nvSpPr>
           <p:cNvPr id="64" name="Title 63"/>
           <p:cNvSpPr>
             <a:spLocks noGrp="1"/>
@@ -4043,14 +4198,13 @@
           <a:lstStyle/>
           <a:p>
             <a:r>
-              <a:rPr lang="en-US" b="1" dirty="0" smtClean="0"/>
+              <a:rPr lang="en-US" b="1" dirty="0"/>
               <a:t>EXISTING </a:t>
             </a:r>
             <a:r>
-              <a:rPr lang="en-US" dirty="0" smtClean="0"/>
+              <a:rPr lang="en-US" dirty="0"/>
               <a:t>Unity Image Assembly Workflow</a:t>
             </a:r>
-            <a:endParaRPr lang="en-US" dirty="0"/>
           </a:p>
         </p:txBody>
       </p:sp>
@@ -4178,48 +4332,45 @@
           <a:p>
             <a:pPr algn="ctr"/>
             <a:r>
-              <a:rPr lang="en-US" sz="1400" dirty="0" smtClean="0">
+              <a:rPr lang="en-US" sz="1400" dirty="0">
                 <a:latin typeface="Consolas" panose="020B0609020204030204" pitchFamily="49" charset="0"/>
               </a:rPr>
               <a:t>github.com/</a:t>
             </a:r>
             <a:r>
-              <a:rPr lang="en-US" sz="1400" dirty="0" err="1" smtClean="0">
+              <a:rPr lang="en-US" sz="1400" dirty="0" err="1">
                 <a:latin typeface="Consolas" panose="020B0609020204030204" pitchFamily="49" charset="0"/>
               </a:rPr>
               <a:t>starlab-io</a:t>
             </a:r>
             <a:r>
-              <a:rPr lang="en-US" sz="1400" dirty="0" smtClean="0">
+              <a:rPr lang="en-US" sz="1400" dirty="0">
                 <a:latin typeface="Consolas" panose="020B0609020204030204" pitchFamily="49" charset="0"/>
               </a:rPr>
               <a:t>/</a:t>
             </a:r>
             <a:r>
-              <a:rPr lang="en-US" sz="1400" dirty="0" err="1" smtClean="0">
+              <a:rPr lang="en-US" sz="1400" dirty="0" err="1">
                 <a:latin typeface="Consolas" panose="020B0609020204030204" pitchFamily="49" charset="0"/>
               </a:rPr>
               <a:t>docker</a:t>
             </a:r>
             <a:r>
-              <a:rPr lang="en-US" sz="1400" dirty="0" smtClean="0">
+              <a:rPr lang="en-US" sz="1400" dirty="0">
                 <a:latin typeface="Consolas" panose="020B0609020204030204" pitchFamily="49" charset="0"/>
               </a:rPr>
               <a:t>-virtue</a:t>
             </a:r>
             <a:r>
-              <a:rPr lang="en-US" sz="1400" dirty="0" smtClean="0"/>
+              <a:rPr lang="en-US" sz="1400" dirty="0"/>
               <a:t> (in </a:t>
             </a:r>
             <a:r>
-              <a:rPr lang="en-US" sz="1400" dirty="0" smtClean="0">
+              <a:rPr lang="en-US" sz="1400" dirty="0">
                 <a:latin typeface="Consolas" panose="020B0609020204030204" pitchFamily="49" charset="0"/>
               </a:rPr>
               <a:t>virtue/)</a:t>
             </a:r>
-            <a:endParaRPr lang="en-US" sz="1400" dirty="0">
-              <a:latin typeface="Consolas" panose="020B0609020204030204" pitchFamily="49" charset="0"/>
-            </a:endParaRPr>
           </a:p>
         </p:txBody>
       </p:sp>
@@ -4247,42 +4398,39 @@
           <a:p>
             <a:pPr algn="ctr"/>
             <a:r>
-              <a:rPr lang="en-US" sz="1400" dirty="0" smtClean="0">
+              <a:rPr lang="en-US" sz="1400" dirty="0">
                 <a:latin typeface="Consolas" panose="020B0609020204030204" pitchFamily="49" charset="0"/>
               </a:rPr>
               <a:t>github.com/</a:t>
             </a:r>
             <a:r>
-              <a:rPr lang="en-US" sz="1400" dirty="0" err="1" smtClean="0">
+              <a:rPr lang="en-US" sz="1400" dirty="0" err="1">
                 <a:latin typeface="Consolas" panose="020B0609020204030204" pitchFamily="49" charset="0"/>
               </a:rPr>
               <a:t>starlab-io</a:t>
             </a:r>
             <a:r>
-              <a:rPr lang="en-US" sz="1400" dirty="0" smtClean="0">
+              <a:rPr lang="en-US" sz="1400" dirty="0">
                 <a:latin typeface="Consolas" panose="020B0609020204030204" pitchFamily="49" charset="0"/>
               </a:rPr>
               <a:t>/</a:t>
             </a:r>
             <a:r>
-              <a:rPr lang="en-US" sz="1400" dirty="0" err="1" smtClean="0">
+              <a:rPr lang="en-US" sz="1400" dirty="0" err="1">
                 <a:latin typeface="Consolas" panose="020B0609020204030204" pitchFamily="49" charset="0"/>
               </a:rPr>
               <a:t>galahad</a:t>
             </a:r>
             <a:r>
-              <a:rPr lang="en-US" sz="1400" dirty="0" smtClean="0"/>
+              <a:rPr lang="en-US" sz="1400" dirty="0"/>
               <a:t> (in unity</a:t>
             </a:r>
             <a:r>
-              <a:rPr lang="en-US" sz="1400" dirty="0" smtClean="0">
+              <a:rPr lang="en-US" sz="1400" dirty="0">
                 <a:latin typeface="Consolas" panose="020B0609020204030204" pitchFamily="49" charset="0"/>
               </a:rPr>
               <a:t>/)</a:t>
             </a:r>
-            <a:endParaRPr lang="en-US" sz="1400" dirty="0">
-              <a:latin typeface="Consolas" panose="020B0609020204030204" pitchFamily="49" charset="0"/>
-            </a:endParaRPr>
           </a:p>
         </p:txBody>
       </p:sp>
@@ -4310,42 +4458,39 @@
           <a:p>
             <a:pPr algn="ctr"/>
             <a:r>
-              <a:rPr lang="en-US" sz="1400" dirty="0" smtClean="0">
+              <a:rPr lang="en-US" sz="1400" dirty="0">
                 <a:latin typeface="Consolas" panose="020B0609020204030204" pitchFamily="49" charset="0"/>
               </a:rPr>
               <a:t>github.com/</a:t>
             </a:r>
             <a:r>
-              <a:rPr lang="en-US" sz="1400" dirty="0" err="1" smtClean="0">
+              <a:rPr lang="en-US" sz="1400" dirty="0" err="1">
                 <a:latin typeface="Consolas" panose="020B0609020204030204" pitchFamily="49" charset="0"/>
               </a:rPr>
               <a:t>starlab-io</a:t>
             </a:r>
             <a:r>
-              <a:rPr lang="en-US" sz="1400" dirty="0" smtClean="0">
+              <a:rPr lang="en-US" sz="1400" dirty="0">
                 <a:latin typeface="Consolas" panose="020B0609020204030204" pitchFamily="49" charset="0"/>
               </a:rPr>
               <a:t>/</a:t>
             </a:r>
             <a:r>
-              <a:rPr lang="en-US" sz="1400" dirty="0" err="1" smtClean="0">
+              <a:rPr lang="en-US" sz="1400" dirty="0" err="1">
                 <a:latin typeface="Consolas" panose="020B0609020204030204" pitchFamily="49" charset="0"/>
               </a:rPr>
               <a:t>galahad</a:t>
             </a:r>
             <a:r>
-              <a:rPr lang="en-US" sz="1400" dirty="0" smtClean="0"/>
+              <a:rPr lang="en-US" sz="1400" dirty="0"/>
               <a:t> (in </a:t>
             </a:r>
             <a:r>
-              <a:rPr lang="en-US" sz="1400" dirty="0" smtClean="0">
+              <a:rPr lang="en-US" sz="1400" dirty="0">
                 <a:latin typeface="Consolas" panose="020B0609020204030204" pitchFamily="49" charset="0"/>
               </a:rPr>
               <a:t>assembler/)</a:t>
             </a:r>
-            <a:endParaRPr lang="en-US" sz="1400" dirty="0">
-              <a:latin typeface="Consolas" panose="020B0609020204030204" pitchFamily="49" charset="0"/>
-            </a:endParaRPr>
           </a:p>
         </p:txBody>
       </p:sp>
@@ -4373,7 +4518,7 @@
           <a:p>
             <a:pPr algn="ctr"/>
             <a:r>
-              <a:rPr lang="en-US" sz="7200" b="1" cap="none" spc="0" dirty="0" smtClean="0">
+              <a:rPr lang="en-US" sz="7200" b="1" cap="none" spc="0" dirty="0">
                 <a:ln w="22225">
                   <a:solidFill>
                     <a:srgbClr val="C00000"/>
@@ -4387,18 +4532,6 @@
               </a:rPr>
               <a:t>Obsolete</a:t>
             </a:r>
-            <a:endParaRPr lang="en-US" sz="7200" b="1" cap="none" spc="0" dirty="0">
-              <a:ln w="22225">
-                <a:solidFill>
-                  <a:srgbClr val="C00000"/>
-                </a:solidFill>
-                <a:prstDash val="solid"/>
-              </a:ln>
-              <a:solidFill>
-                <a:srgbClr val="FF0000"/>
-              </a:solidFill>
-              <a:effectLst/>
-            </a:endParaRPr>
           </a:p>
         </p:txBody>
       </p:sp>
@@ -4448,10 +4581,9 @@
           <a:lstStyle/>
           <a:p>
             <a:r>
-              <a:rPr lang="en-US" dirty="0" smtClean="0"/>
+              <a:rPr lang="en-US" dirty="0"/>
               <a:t>Definition of Terms</a:t>
             </a:r>
-            <a:endParaRPr lang="en-US" dirty="0"/>
           </a:p>
         </p:txBody>
       </p:sp>
@@ -4472,26 +4604,46 @@
           </a:xfrm>
         </p:spPr>
         <p:txBody>
-          <a:bodyPr/>
-          <a:lstStyle/>
-          <a:p>
-            <a:r>
-              <a:rPr lang="en-US" dirty="0" smtClean="0"/>
-              <a:t>Construct: build the code and produce artifacts like .deb files</a:t>
-            </a:r>
-          </a:p>
-          <a:p>
-            <a:r>
-              <a:rPr lang="en-US" dirty="0" smtClean="0"/>
-              <a:t>Assemble: pull the artifacts together into deployable form</a:t>
-            </a:r>
-          </a:p>
-          <a:p>
-            <a:r>
-              <a:rPr lang="en-US" dirty="0" smtClean="0"/>
-              <a:t>Provision: deploy the assembled thing into the environment</a:t>
+          <a:bodyPr vert="horz" lIns="91440" tIns="45720" rIns="91440" bIns="45720" rtlCol="0" anchor="t">
+            <a:normAutofit/>
+          </a:bodyPr>
+          <a:lstStyle/>
+          <a:p>
+            <a:r>
+              <a:rPr lang="en-US" dirty="0"/>
+              <a:t>Construct: convert a clean Ubuntu PVM into a</a:t>
+            </a:r>
+            <a:r>
+              <a:rPr lang="en-US" dirty="0">
+                <a:cs typeface="Calibri"/>
+              </a:rPr>
+              <a:t> Unity</a:t>
             </a:r>
             <a:endParaRPr lang="en-US" dirty="0"/>
+          </a:p>
+          <a:p>
+            <a:r>
+              <a:rPr lang="en-US" dirty="0"/>
+              <a:t>Assemble: </a:t>
+            </a:r>
+            <a:r>
+              <a:rPr lang="en-US" dirty="0">
+                <a:cs typeface="Calibri"/>
+              </a:rPr>
+              <a:t>create a Virtue by installing Docker containers on a Unity</a:t>
+            </a:r>
+          </a:p>
+          <a:p>
+            <a:r>
+              <a:rPr lang="en-US" dirty="0"/>
+              <a:t>Provision: </a:t>
+            </a:r>
+            <a:r>
+              <a:rPr lang="en-US" dirty="0">
+                <a:cs typeface="Calibri"/>
+              </a:rPr>
+              <a:t>install keys and user-specific data onto a Virtue</a:t>
+            </a:r>
           </a:p>
         </p:txBody>
       </p:sp>
@@ -4532,14 +4684,11 @@
           <a:p>
             <a:pPr algn="ctr"/>
             <a:r>
-              <a:rPr lang="en-US" dirty="0" smtClean="0">
+              <a:rPr lang="en-US" dirty="0">
                 <a:latin typeface="Consolas" panose="020B0609020204030204" pitchFamily="49" charset="0"/>
               </a:rPr>
-              <a:t>construct</a:t>
-            </a:r>
-            <a:endParaRPr lang="en-US" dirty="0">
-              <a:latin typeface="Consolas" panose="020B0609020204030204" pitchFamily="49" charset="0"/>
-            </a:endParaRPr>
+              <a:t>2. Construct</a:t>
+            </a:r>
           </a:p>
         </p:txBody>
       </p:sp>
@@ -4580,14 +4729,11 @@
           <a:p>
             <a:pPr algn="ctr"/>
             <a:r>
-              <a:rPr lang="en-US" dirty="0" smtClean="0">
+              <a:rPr lang="en-US" dirty="0">
                 <a:latin typeface="Consolas" panose="020B0609020204030204" pitchFamily="49" charset="0"/>
               </a:rPr>
-              <a:t>assemble</a:t>
-            </a:r>
-            <a:endParaRPr lang="en-US" dirty="0">
-              <a:latin typeface="Consolas" panose="020B0609020204030204" pitchFamily="49" charset="0"/>
-            </a:endParaRPr>
+              <a:t>3. Assemble</a:t>
+            </a:r>
           </a:p>
         </p:txBody>
       </p:sp>
@@ -4628,14 +4774,11 @@
           <a:p>
             <a:pPr algn="ctr"/>
             <a:r>
-              <a:rPr lang="en-US" dirty="0" smtClean="0">
+              <a:rPr lang="en-US" dirty="0">
                 <a:latin typeface="Consolas" panose="020B0609020204030204" pitchFamily="49" charset="0"/>
               </a:rPr>
-              <a:t>provision</a:t>
-            </a:r>
-            <a:endParaRPr lang="en-US" dirty="0">
-              <a:latin typeface="Consolas" panose="020B0609020204030204" pitchFamily="49" charset="0"/>
-            </a:endParaRPr>
+              <a:t>4. Provision</a:t>
+            </a:r>
           </a:p>
         </p:txBody>
       </p:sp>
@@ -4761,8 +4904,8 @@
         </p:nvSpPr>
         <p:spPr>
           <a:xfrm>
-            <a:off x="3945932" y="3809629"/>
-            <a:ext cx="938077" cy="830997"/>
+            <a:off x="3797870" y="4132902"/>
+            <a:ext cx="1188018" cy="338554"/>
           </a:xfrm>
           <a:prstGeom prst="rect">
             <a:avLst/>
@@ -4770,30 +4913,23 @@
           <a:noFill/>
         </p:spPr>
         <p:txBody>
-          <a:bodyPr wrap="none" rtlCol="0">
+          <a:bodyPr wrap="none" rtlCol="0" anchor="t">
             <a:spAutoFit/>
           </a:bodyPr>
           <a:lstStyle/>
           <a:p>
             <a:pPr algn="ctr"/>
             <a:r>
-              <a:rPr lang="en-US" sz="1600" dirty="0" smtClean="0"/>
-              <a:t>.deb files</a:t>
-            </a:r>
-            <a:br>
-              <a:rPr lang="en-US" sz="1600" dirty="0" smtClean="0"/>
-            </a:br>
-            <a:r>
-              <a:rPr lang="en-US" sz="1600" dirty="0" smtClean="0"/>
-              <a:t>base VM</a:t>
-            </a:r>
-          </a:p>
-          <a:p>
-            <a:pPr algn="ctr"/>
-            <a:r>
-              <a:rPr lang="en-US" sz="1600" dirty="0" smtClean="0"/>
-              <a:t>etc.</a:t>
-            </a:r>
+              <a:rPr lang="en-US" sz="1600" dirty="0"/>
+              <a:t>Unity</a:t>
+            </a:r>
+            <a:r>
+              <a:rPr lang="en-US" sz="1600" dirty="0">
+                <a:cs typeface="Calibri"/>
+              </a:rPr>
+              <a:t> Image</a:t>
+            </a:r>
+            <a:endParaRPr lang="en-US" dirty="0"/>
           </a:p>
         </p:txBody>
       </p:sp>
@@ -4843,8 +4979,8 @@
         </p:nvSpPr>
         <p:spPr>
           <a:xfrm>
-            <a:off x="769764" y="4055851"/>
-            <a:ext cx="753924" cy="584775"/>
+            <a:off x="250971" y="3882669"/>
+            <a:ext cx="1606787" cy="830997"/>
           </a:xfrm>
           <a:prstGeom prst="rect">
             <a:avLst/>
@@ -4852,24 +4988,34 @@
           <a:noFill/>
         </p:spPr>
         <p:txBody>
-          <a:bodyPr wrap="none" rtlCol="0">
+          <a:bodyPr wrap="none" rtlCol="0" anchor="t">
             <a:spAutoFit/>
           </a:bodyPr>
           <a:lstStyle/>
           <a:p>
             <a:pPr algn="ctr"/>
             <a:r>
-              <a:rPr lang="en-US" sz="1600" dirty="0" smtClean="0"/>
-              <a:t>Source</a:t>
+              <a:rPr lang="en-US" sz="1600" dirty="0"/>
+              <a:t>1. Ubuntu PVM +</a:t>
+            </a:r>
+            <a:endParaRPr lang="en-US" dirty="0"/>
+          </a:p>
+          <a:p>
+            <a:pPr algn="ctr"/>
+            <a:r>
+              <a:rPr lang="en-US" sz="1600" dirty="0"/>
+              <a:t>Galahad Source</a:t>
             </a:r>
             <a:br>
-              <a:rPr lang="en-US" sz="1600" dirty="0" smtClean="0"/>
+              <a:rPr lang="en-US" sz="1600" dirty="0">
+                <a:cs typeface="Calibri"/>
+              </a:rPr>
             </a:br>
             <a:r>
-              <a:rPr lang="en-US" sz="1600" dirty="0" smtClean="0"/>
+              <a:rPr lang="en-US" sz="1600" dirty="0"/>
               <a:t>Code</a:t>
             </a:r>
-            <a:endParaRPr lang="en-US" sz="1600" dirty="0"/>
+            <a:endParaRPr lang="en-US" dirty="0"/>
           </a:p>
         </p:txBody>
       </p:sp>
@@ -4881,8 +5027,8 @@
         </p:nvSpPr>
         <p:spPr>
           <a:xfrm>
-            <a:off x="7292956" y="4055851"/>
-            <a:ext cx="774443" cy="584775"/>
+            <a:off x="7168638" y="4055851"/>
+            <a:ext cx="699229" cy="584775"/>
           </a:xfrm>
           <a:prstGeom prst="rect">
             <a:avLst/>
@@ -4890,24 +5036,25 @@
           <a:noFill/>
         </p:spPr>
         <p:txBody>
-          <a:bodyPr wrap="none" rtlCol="0">
+          <a:bodyPr wrap="none" rtlCol="0" anchor="t">
             <a:spAutoFit/>
           </a:bodyPr>
           <a:lstStyle/>
           <a:p>
             <a:pPr algn="ctr"/>
             <a:r>
-              <a:rPr lang="en-US" sz="1600" dirty="0" smtClean="0"/>
+              <a:rPr lang="en-US" sz="1600" dirty="0"/>
               <a:t>Virtue</a:t>
             </a:r>
             <a:br>
-              <a:rPr lang="en-US" sz="1600" dirty="0" smtClean="0"/>
+              <a:rPr lang="en-US" sz="1600" dirty="0">
+                <a:cs typeface="Calibri"/>
+              </a:rPr>
             </a:br>
             <a:r>
-              <a:rPr lang="en-US" sz="1600" dirty="0" smtClean="0"/>
-              <a:t>Images</a:t>
-            </a:r>
-            <a:endParaRPr lang="en-US" sz="1600" dirty="0"/>
+              <a:rPr lang="en-US" sz="1600" dirty="0"/>
+              <a:t>Image</a:t>
+            </a:r>
           </a:p>
         </p:txBody>
       </p:sp>
@@ -4919,8 +5066,8 @@
         </p:nvSpPr>
         <p:spPr>
           <a:xfrm>
-            <a:off x="10424831" y="4055851"/>
-            <a:ext cx="869149" cy="584775"/>
+            <a:off x="10323842" y="4055851"/>
+            <a:ext cx="1071127" cy="584775"/>
           </a:xfrm>
           <a:prstGeom prst="rect">
             <a:avLst/>
@@ -4928,24 +5075,25 @@
           <a:noFill/>
         </p:spPr>
         <p:txBody>
-          <a:bodyPr wrap="none" rtlCol="0">
+          <a:bodyPr wrap="none" rtlCol="0" anchor="t">
             <a:spAutoFit/>
           </a:bodyPr>
           <a:lstStyle/>
           <a:p>
             <a:pPr algn="ctr"/>
             <a:r>
-              <a:rPr lang="en-US" sz="1600" dirty="0" smtClean="0"/>
-              <a:t>Running</a:t>
+              <a:rPr lang="en-US" sz="1600" dirty="0"/>
+              <a:t>5. Running</a:t>
             </a:r>
             <a:br>
-              <a:rPr lang="en-US" sz="1600" dirty="0" smtClean="0"/>
+              <a:rPr lang="en-US" sz="1600" dirty="0">
+                <a:cs typeface="Calibri"/>
+              </a:rPr>
             </a:br>
             <a:r>
-              <a:rPr lang="en-US" sz="1600" dirty="0" smtClean="0"/>
-              <a:t>Virtues</a:t>
-            </a:r>
-            <a:endParaRPr lang="en-US" sz="1600" dirty="0"/>
+              <a:rPr lang="en-US" sz="1600" dirty="0"/>
+              <a:t>Virtue</a:t>
+            </a:r>
           </a:p>
         </p:txBody>
       </p:sp>
@@ -4981,6 +5129,192 @@
       </p:grpSpPr>
       <p:sp>
         <p:nvSpPr>
+          <p:cNvPr id="2" name="Title 1">
+            <a:extLst>
+              <a:ext uri="{FF2B5EF4-FFF2-40B4-BE49-F238E27FC236}">
+                <a16:creationId xmlns:a16="http://schemas.microsoft.com/office/drawing/2014/main" id="{CC079B24-D7D6-492A-AE19-A2EA6B50F222}"/>
+              </a:ext>
+            </a:extLst>
+          </p:cNvPr>
+          <p:cNvSpPr>
+            <a:spLocks noGrp="1"/>
+          </p:cNvSpPr>
+          <p:nvPr>
+            <p:ph type="title"/>
+          </p:nvPr>
+        </p:nvSpPr>
+        <p:spPr>
+          <a:xfrm>
+            <a:off x="838200" y="365125"/>
+            <a:ext cx="10515600" cy="1192213"/>
+          </a:xfrm>
+        </p:spPr>
+        <p:txBody>
+          <a:bodyPr/>
+          <a:lstStyle/>
+          <a:p>
+            <a:r>
+              <a:rPr lang="en-US" dirty="0">
+                <a:cs typeface="Calibri Light"/>
+              </a:rPr>
+              <a:t>Walkthrough of Full Assembly Process</a:t>
+            </a:r>
+            <a:endParaRPr lang="en-US" dirty="0"/>
+          </a:p>
+        </p:txBody>
+      </p:sp>
+      <p:sp>
+        <p:nvSpPr>
+          <p:cNvPr id="3" name="Content Placeholder 2">
+            <a:extLst>
+              <a:ext uri="{FF2B5EF4-FFF2-40B4-BE49-F238E27FC236}">
+                <a16:creationId xmlns:a16="http://schemas.microsoft.com/office/drawing/2014/main" id="{4B853DF4-2BD4-4680-B1E8-3B2A5A9B844F}"/>
+              </a:ext>
+            </a:extLst>
+          </p:cNvPr>
+          <p:cNvSpPr>
+            <a:spLocks noGrp="1"/>
+          </p:cNvSpPr>
+          <p:nvPr>
+            <p:ph idx="1"/>
+          </p:nvPr>
+        </p:nvSpPr>
+        <p:spPr>
+          <a:xfrm>
+            <a:off x="838200" y="1562377"/>
+            <a:ext cx="10515600" cy="4786036"/>
+          </a:xfrm>
+        </p:spPr>
+        <p:txBody>
+          <a:bodyPr vert="horz" lIns="91440" tIns="45720" rIns="91440" bIns="45720" rtlCol="0" anchor="t">
+            <a:noAutofit/>
+          </a:bodyPr>
+          <a:lstStyle/>
+          <a:p>
+            <a:pPr marL="0" indent="0">
+              <a:buNone/>
+            </a:pPr>
+            <a:r>
+              <a:rPr lang="en-US" sz="2000" dirty="0">
+                <a:cs typeface="Calibri"/>
+              </a:rPr>
+              <a:t>1. At the start of the assembly pipeline, the Constructor needs access to an Ubuntu PVM image and source code required to create a Unity. In CI, the Ubuntu PVM is created by an augmented AWS instance with additional Xen tools, including the command xen-create-image.</a:t>
+            </a:r>
+          </a:p>
+          <a:p>
+            <a:pPr marL="0" indent="0">
+              <a:buNone/>
+            </a:pPr>
+            <a:r>
+              <a:rPr lang="en-US" sz="2000" dirty="0">
+                <a:cs typeface="Calibri"/>
+              </a:rPr>
+              <a:t>2. During Construction, all required source code is compiled into .deb files and the Ubuntu image is mounted to a directory. Tools such as chroot are used to set up virtue users and install required packages and .deb files, including the Galahad Kernel patches, Merlin, the LSM, Transducers, and the Docker daemon. The resulting Unity will seldom need to be re-constructed and only lacks Docker-containerized applications, key files, and any user-specific data.</a:t>
+            </a:r>
+          </a:p>
+          <a:p>
+            <a:pPr marL="0" indent="0">
+              <a:buNone/>
+            </a:pPr>
+            <a:r>
+              <a:rPr lang="en-US" sz="2000" dirty="0">
+                <a:cs typeface="Calibri"/>
+              </a:rPr>
+              <a:t>3. The Assembly step installs role-specific Docker containers onto a copied Unity to produce a non-provisioned Virtue. This process cannot be done to a mounted image. It requires a Unity to be running on a Valor in order to interact with the Docker daemon. Assembly is run every time the API call </a:t>
+            </a:r>
+            <a:r>
+              <a:rPr lang="en-US" sz="2000" i="1" dirty="0">
+                <a:cs typeface="Calibri"/>
+              </a:rPr>
+              <a:t>role create</a:t>
+            </a:r>
+            <a:r>
+              <a:rPr lang="en-US" sz="2000" dirty="0">
+                <a:cs typeface="Calibri"/>
+              </a:rPr>
+              <a:t> is made.</a:t>
+            </a:r>
+          </a:p>
+          <a:p>
+            <a:pPr marL="0" indent="0">
+              <a:buNone/>
+            </a:pPr>
+            <a:r>
+              <a:rPr lang="en-US" sz="2000" dirty="0">
+                <a:cs typeface="Calibri"/>
+              </a:rPr>
+              <a:t>4. Provisioning mounts a copy of the non-provisioned Virtue and installs key files and user data. The API call </a:t>
+            </a:r>
+            <a:r>
+              <a:rPr lang="en-US" sz="2000" i="1" dirty="0">
+                <a:cs typeface="Calibri"/>
+              </a:rPr>
+              <a:t>virtue create</a:t>
+            </a:r>
+            <a:r>
+              <a:rPr lang="en-US" sz="2000" dirty="0">
+                <a:cs typeface="Calibri"/>
+              </a:rPr>
+              <a:t> triggers provisioning.</a:t>
+            </a:r>
+          </a:p>
+          <a:p>
+            <a:pPr marL="0" indent="0">
+              <a:buNone/>
+            </a:pPr>
+            <a:r>
+              <a:rPr lang="en-US" sz="2000" dirty="0">
+                <a:cs typeface="Calibri"/>
+              </a:rPr>
+              <a:t>5. The end-result is a fully operational Virtue, ready to be launched by the User call </a:t>
+            </a:r>
+            <a:r>
+              <a:rPr lang="en-US" sz="2000" i="1" dirty="0">
+                <a:cs typeface="Calibri"/>
+              </a:rPr>
+              <a:t>virtue launch</a:t>
+            </a:r>
+            <a:r>
+              <a:rPr lang="en-US" sz="2000" dirty="0">
+                <a:cs typeface="Calibri"/>
+              </a:rPr>
+              <a:t>.</a:t>
+            </a:r>
+          </a:p>
+        </p:txBody>
+      </p:sp>
+    </p:spTree>
+    <p:extLst>
+      <p:ext uri="{BB962C8B-B14F-4D97-AF65-F5344CB8AC3E}">
+        <p14:creationId xmlns:p14="http://schemas.microsoft.com/office/powerpoint/2010/main" val="3592764685"/>
+      </p:ext>
+    </p:extLst>
+  </p:cSld>
+  <p:clrMapOvr>
+    <a:masterClrMapping/>
+  </p:clrMapOvr>
+</p:sld>
+</file>
+
+<file path=ppt/slides/slide4.xml><?xml version="1.0" encoding="utf-8"?>
+<p:sld xmlns:a="http://schemas.openxmlformats.org/drawingml/2006/main" xmlns:r="http://schemas.openxmlformats.org/officeDocument/2006/relationships" xmlns:p="http://schemas.openxmlformats.org/presentationml/2006/main">
+  <p:cSld>
+    <p:spTree>
+      <p:nvGrpSpPr>
+        <p:cNvPr id="1" name=""/>
+        <p:cNvGrpSpPr/>
+        <p:nvPr/>
+      </p:nvGrpSpPr>
+      <p:grpSpPr>
+        <a:xfrm>
+          <a:off x="0" y="0"/>
+          <a:ext cx="0" cy="0"/>
+          <a:chOff x="0" y="0"/>
+          <a:chExt cx="0" cy="0"/>
+        </a:xfrm>
+      </p:grpSpPr>
+      <p:sp>
+        <p:nvSpPr>
           <p:cNvPr id="126" name="Rectangle 125"/>
           <p:cNvSpPr/>
           <p:nvPr/>
@@ -5017,10 +5351,9 @@
           <a:p>
             <a:pPr algn="ctr"/>
             <a:r>
-              <a:rPr lang="en-US" i="1" dirty="0" smtClean="0"/>
+              <a:rPr lang="en-US" i="1" dirty="0"/>
               <a:t>Building the Docker Containers</a:t>
             </a:r>
-            <a:endParaRPr lang="en-US" i="1" dirty="0"/>
           </a:p>
         </p:txBody>
       </p:sp>
@@ -5062,10 +5395,9 @@
           <a:p>
             <a:pPr algn="ctr"/>
             <a:r>
-              <a:rPr lang="en-US" i="1" dirty="0" smtClean="0"/>
+              <a:rPr lang="en-US" i="1" dirty="0"/>
               <a:t>Building the Unity Base Image</a:t>
             </a:r>
-            <a:endParaRPr lang="en-US" i="1" dirty="0"/>
           </a:p>
         </p:txBody>
       </p:sp>
@@ -5103,18 +5435,13 @@
           <a:lstStyle/>
           <a:p>
             <a:r>
-              <a:rPr lang="en-US" sz="1400" dirty="0" smtClean="0">
+              <a:rPr lang="en-US" sz="1400" dirty="0">
                 <a:solidFill>
                   <a:schemeClr val="accent1"/>
                 </a:solidFill>
               </a:rPr>
               <a:t>External Dependencies</a:t>
             </a:r>
-            <a:endParaRPr lang="en-US" sz="1400" dirty="0">
-              <a:solidFill>
-                <a:schemeClr val="accent1"/>
-              </a:solidFill>
-            </a:endParaRPr>
           </a:p>
         </p:txBody>
       </p:sp>
@@ -5152,18 +5479,13 @@
           <a:lstStyle/>
           <a:p>
             <a:r>
-              <a:rPr lang="en-US" sz="1200" dirty="0" smtClean="0">
+              <a:rPr lang="en-US" sz="1200" dirty="0">
                 <a:solidFill>
                   <a:schemeClr val="accent2"/>
                 </a:solidFill>
               </a:rPr>
               <a:t>Galahad Sources</a:t>
             </a:r>
-            <a:endParaRPr lang="en-US" sz="1200" dirty="0">
-              <a:solidFill>
-                <a:schemeClr val="accent2"/>
-              </a:solidFill>
-            </a:endParaRPr>
           </a:p>
         </p:txBody>
       </p:sp>
@@ -5190,10 +5512,9 @@
           <a:lstStyle/>
           <a:p>
             <a:r>
-              <a:rPr lang="en-US" sz="3600" dirty="0" smtClean="0"/>
+              <a:rPr lang="en-US" sz="3600" dirty="0"/>
               <a:t>Construct the Galahad Components</a:t>
             </a:r>
-            <a:endParaRPr lang="en-US" sz="3600" dirty="0"/>
           </a:p>
         </p:txBody>
       </p:sp>
@@ -5232,10 +5553,9 @@
           <a:p>
             <a:pPr algn="ctr"/>
             <a:r>
-              <a:rPr lang="en-US" sz="1200" dirty="0" smtClean="0"/>
+              <a:rPr lang="en-US" sz="1200" dirty="0"/>
               <a:t>Unity Kernel DEB file</a:t>
             </a:r>
-            <a:endParaRPr lang="en-US" sz="1200" dirty="0"/>
           </a:p>
         </p:txBody>
       </p:sp>
@@ -5274,10 +5594,9 @@
           <a:p>
             <a:pPr algn="ctr"/>
             <a:r>
-              <a:rPr lang="en-US" sz="1200" dirty="0" smtClean="0"/>
+              <a:rPr lang="en-US" sz="1200" dirty="0"/>
               <a:t>Upstream Kernel Src</a:t>
             </a:r>
-            <a:endParaRPr lang="en-US" sz="1200" dirty="0"/>
           </a:p>
         </p:txBody>
       </p:sp>
@@ -5316,10 +5635,9 @@
           <a:p>
             <a:pPr algn="ctr"/>
             <a:r>
-              <a:rPr lang="en-US" sz="1200" dirty="0" smtClean="0"/>
+              <a:rPr lang="en-US" sz="1200" dirty="0"/>
               <a:t>LSM</a:t>
             </a:r>
-            <a:endParaRPr lang="en-US" sz="1200" dirty="0"/>
           </a:p>
         </p:txBody>
       </p:sp>
@@ -5394,10 +5712,9 @@
           <a:p>
             <a:pPr algn="ctr"/>
             <a:r>
-              <a:rPr lang="en-US" sz="1200" dirty="0" smtClean="0"/>
+              <a:rPr lang="en-US" sz="1200" dirty="0"/>
               <a:t>Virtue Patches</a:t>
             </a:r>
-            <a:endParaRPr lang="en-US" sz="1200" dirty="0"/>
           </a:p>
         </p:txBody>
       </p:sp>
@@ -5472,10 +5789,9 @@
           <a:p>
             <a:pPr algn="ctr"/>
             <a:r>
-              <a:rPr lang="en-US" sz="1200" dirty="0" smtClean="0"/>
+              <a:rPr lang="en-US" sz="1200" dirty="0"/>
               <a:t>merlin.deb</a:t>
             </a:r>
-            <a:endParaRPr lang="en-US" sz="1200" dirty="0"/>
           </a:p>
         </p:txBody>
       </p:sp>
@@ -5514,11 +5830,11 @@
           <a:p>
             <a:pPr algn="ctr"/>
             <a:r>
-              <a:rPr lang="en-US" sz="1200" dirty="0" smtClean="0"/>
+              <a:rPr lang="en-US" sz="1200" dirty="0"/>
               <a:t>Merlin </a:t>
             </a:r>
             <a:r>
-              <a:rPr lang="en-US" sz="1200" dirty="0" err="1" smtClean="0"/>
+              <a:rPr lang="en-US" sz="1200" dirty="0" err="1"/>
               <a:t>src</a:t>
             </a:r>
             <a:endParaRPr lang="en-US" sz="1200" dirty="0"/>
@@ -5596,10 +5912,9 @@
           <a:p>
             <a:pPr algn="ctr"/>
             <a:r>
-              <a:rPr lang="en-US" sz="1200" dirty="0" smtClean="0"/>
+              <a:rPr lang="en-US" sz="1200" dirty="0"/>
               <a:t>Docker</a:t>
             </a:r>
-            <a:endParaRPr lang="en-US" sz="1200" dirty="0"/>
           </a:p>
         </p:txBody>
       </p:sp>
@@ -5638,10 +5953,9 @@
           <a:p>
             <a:pPr algn="ctr"/>
             <a:r>
-              <a:rPr lang="en-US" sz="1200" dirty="0" smtClean="0"/>
+              <a:rPr lang="en-US" sz="1200" dirty="0"/>
               <a:t>Python</a:t>
             </a:r>
-            <a:endParaRPr lang="en-US" sz="1200" dirty="0"/>
           </a:p>
         </p:txBody>
       </p:sp>
@@ -5680,10 +5994,9 @@
           <a:p>
             <a:pPr algn="ctr"/>
             <a:r>
-              <a:rPr lang="en-US" sz="1200" dirty="0" smtClean="0"/>
+              <a:rPr lang="en-US" sz="1200" dirty="0"/>
               <a:t>SSHD</a:t>
             </a:r>
-            <a:endParaRPr lang="en-US" sz="1200" dirty="0"/>
           </a:p>
         </p:txBody>
       </p:sp>
@@ -5830,10 +6143,15 @@
           <a:p>
             <a:pPr algn="ctr"/>
             <a:r>
-              <a:rPr lang="en-US" sz="1200" dirty="0" smtClean="0"/>
-              <a:t>Ubuntu 16.04.03 LTS</a:t>
-            </a:r>
-            <a:endParaRPr lang="en-US" sz="1200" dirty="0"/>
+              <a:rPr lang="en-US" sz="1200" dirty="0"/>
+              <a:t>Latest Ubuntu 16.04 </a:t>
+            </a:r>
+            <a:r>
+              <a:rPr lang="en-US" sz="1200" dirty="0">
+                <a:cs typeface="Calibri"/>
+              </a:rPr>
+              <a:t>PVM</a:t>
+            </a:r>
           </a:p>
         </p:txBody>
       </p:sp>
@@ -5872,21 +6190,21 @@
           <a:p>
             <a:pPr algn="ctr"/>
             <a:r>
-              <a:rPr lang="en-US" dirty="0" smtClean="0"/>
+              <a:rPr lang="en-US" dirty="0"/>
               <a:t>Unity</a:t>
             </a:r>
             <a:br>
-              <a:rPr lang="en-US" dirty="0" smtClean="0"/>
+              <a:rPr lang="en-US" dirty="0"/>
             </a:br>
             <a:r>
-              <a:rPr lang="en-US" dirty="0" smtClean="0"/>
+              <a:rPr lang="en-US" dirty="0"/>
               <a:t>Base</a:t>
             </a:r>
             <a:br>
-              <a:rPr lang="en-US" dirty="0" smtClean="0"/>
+              <a:rPr lang="en-US" dirty="0"/>
             </a:br>
             <a:r>
-              <a:rPr lang="en-US" dirty="0" smtClean="0"/>
+              <a:rPr lang="en-US" dirty="0"/>
               <a:t>Image</a:t>
             </a:r>
           </a:p>
@@ -6153,10 +6471,9 @@
           <a:p>
             <a:pPr algn="ctr"/>
             <a:r>
-              <a:rPr lang="en-US" sz="1200" dirty="0" smtClean="0"/>
+              <a:rPr lang="en-US" sz="1200" dirty="0"/>
               <a:t>Ubuntu APT Repos</a:t>
             </a:r>
-            <a:endParaRPr lang="en-US" sz="1200" dirty="0"/>
           </a:p>
         </p:txBody>
       </p:sp>
@@ -6244,18 +6561,13 @@
             <a:lstStyle/>
             <a:p>
               <a:r>
-                <a:rPr lang="en-US" sz="1200" dirty="0" smtClean="0">
+                <a:rPr lang="en-US" sz="1200" dirty="0">
                   <a:solidFill>
                     <a:schemeClr val="accent2"/>
                   </a:solidFill>
                 </a:rPr>
                 <a:t>Per-application Dockerfile</a:t>
               </a:r>
-              <a:endParaRPr lang="en-US" sz="1200" dirty="0">
-                <a:solidFill>
-                  <a:schemeClr val="accent2"/>
-                </a:solidFill>
-              </a:endParaRPr>
             </a:p>
           </p:txBody>
         </p:sp>
@@ -6294,17 +6606,16 @@
             <a:p>
               <a:pPr algn="ctr"/>
               <a:r>
-                <a:rPr lang="en-US" sz="1600" dirty="0" smtClean="0"/>
+                <a:rPr lang="en-US" sz="1600" dirty="0"/>
                 <a:t>Base </a:t>
               </a:r>
               <a:br>
-                <a:rPr lang="en-US" sz="1600" dirty="0" smtClean="0"/>
+                <a:rPr lang="en-US" sz="1600" dirty="0"/>
               </a:br>
               <a:r>
-                <a:rPr lang="en-US" sz="1600" dirty="0" smtClean="0"/>
+                <a:rPr lang="en-US" sz="1600" dirty="0"/>
                 <a:t>Container</a:t>
               </a:r>
-              <a:endParaRPr lang="en-US" sz="1600" dirty="0"/>
             </a:p>
           </p:txBody>
         </p:sp>
@@ -6343,10 +6654,9 @@
             <a:p>
               <a:pPr algn="ctr"/>
               <a:r>
-                <a:rPr lang="en-US" sz="1600" dirty="0" smtClean="0"/>
+                <a:rPr lang="en-US" sz="1600" dirty="0"/>
                 <a:t>XPRA</a:t>
               </a:r>
-              <a:endParaRPr lang="en-US" sz="1600" dirty="0"/>
             </a:p>
           </p:txBody>
         </p:sp>
@@ -6386,10 +6696,9 @@
             <a:p>
               <a:pPr algn="ctr"/>
               <a:r>
-                <a:rPr lang="en-US" sz="1600" dirty="0" smtClean="0"/>
+                <a:rPr lang="en-US" sz="1600" dirty="0"/>
                 <a:t>SSH</a:t>
               </a:r>
-              <a:endParaRPr lang="en-US" sz="1600" dirty="0"/>
             </a:p>
           </p:txBody>
         </p:sp>
@@ -6428,10 +6737,9 @@
             <a:p>
               <a:pPr algn="ctr"/>
               <a:r>
-                <a:rPr lang="en-US" sz="1600" dirty="0" smtClean="0"/>
+                <a:rPr lang="en-US" sz="1600" dirty="0"/>
                 <a:t>xvfb</a:t>
               </a:r>
-              <a:endParaRPr lang="en-US" sz="1600" dirty="0"/>
             </a:p>
           </p:txBody>
         </p:sp>
@@ -6472,10 +6780,9 @@
             <a:lstStyle/>
             <a:p>
               <a:r>
-                <a:rPr lang="en-US" sz="1400" i="1" dirty="0" smtClean="0"/>
+                <a:rPr lang="en-US" sz="1400" i="1" dirty="0"/>
                 <a:t>Application</a:t>
               </a:r>
-              <a:endParaRPr lang="en-US" sz="1400" i="1" dirty="0"/>
             </a:p>
           </p:txBody>
         </p:sp>
@@ -6515,10 +6822,9 @@
             <a:p>
               <a:pPr algn="ctr"/>
               <a:r>
-                <a:rPr lang="en-US" sz="1400" i="1" dirty="0" smtClean="0"/>
+                <a:rPr lang="en-US" sz="1400" i="1" dirty="0"/>
                 <a:t>Crossover</a:t>
               </a:r>
-              <a:endParaRPr lang="en-US" sz="1400" i="1" dirty="0"/>
             </a:p>
           </p:txBody>
         </p:sp>
@@ -6558,10 +6864,9 @@
           <a:p>
             <a:pPr algn="ctr"/>
             <a:r>
-              <a:rPr lang="en-US" sz="1600" dirty="0" smtClean="0"/>
+              <a:rPr lang="en-US" sz="1600" dirty="0"/>
               <a:t>AWS Elastic Container Registry</a:t>
             </a:r>
-            <a:endParaRPr lang="en-US" sz="1600" dirty="0"/>
           </a:p>
         </p:txBody>
       </p:sp>
@@ -6600,10 +6905,9 @@
           <a:p>
             <a:pPr algn="ctr"/>
             <a:r>
-              <a:rPr lang="en-US" sz="1200" dirty="0" smtClean="0"/>
+              <a:rPr lang="en-US" sz="1200" dirty="0"/>
               <a:t>App 1</a:t>
             </a:r>
-            <a:endParaRPr lang="en-US" sz="1200" dirty="0"/>
           </a:p>
         </p:txBody>
       </p:sp>
@@ -6642,10 +6946,9 @@
           <a:p>
             <a:pPr algn="ctr"/>
             <a:r>
-              <a:rPr lang="en-US" sz="1200" dirty="0" smtClean="0"/>
+              <a:rPr lang="en-US" sz="1200" dirty="0"/>
               <a:t>…</a:t>
             </a:r>
-            <a:endParaRPr lang="en-US" sz="1200" dirty="0"/>
           </a:p>
         </p:txBody>
       </p:sp>
@@ -6684,10 +6987,9 @@
           <a:p>
             <a:pPr algn="ctr"/>
             <a:r>
-              <a:rPr lang="en-US" sz="1200" dirty="0" smtClean="0"/>
+              <a:rPr lang="en-US" sz="1200" dirty="0"/>
               <a:t>App N</a:t>
             </a:r>
-            <a:endParaRPr lang="en-US" sz="1200" dirty="0"/>
           </a:p>
         </p:txBody>
       </p:sp>
@@ -6736,7 +7038,7 @@
         <p:spPr>
           <a:xfrm>
             <a:off x="4442181" y="2169182"/>
-            <a:ext cx="1421799" cy="461665"/>
+            <a:ext cx="1325171" cy="276999"/>
           </a:xfrm>
           <a:prstGeom prst="rect">
             <a:avLst/>
@@ -6744,22 +7046,28 @@
           <a:noFill/>
         </p:spPr>
         <p:txBody>
-          <a:bodyPr wrap="none" rtlCol="0">
+          <a:bodyPr wrap="none" rtlCol="0" anchor="t">
             <a:spAutoFit/>
           </a:bodyPr>
           <a:lstStyle/>
           <a:p>
             <a:r>
-              <a:rPr lang="en-US" sz="1200" i="1" dirty="0" smtClean="0"/>
-              <a:t>Can be an AWS AMI</a:t>
-            </a:r>
-            <a:br>
-              <a:rPr lang="en-US" sz="1200" i="1" dirty="0" smtClean="0"/>
-            </a:br>
-            <a:r>
-              <a:rPr lang="en-US" sz="1200" i="1" dirty="0" smtClean="0"/>
-              <a:t>or a Xen VM</a:t>
-            </a:r>
+              <a:rPr lang="en-US" sz="1200" i="1" dirty="0"/>
+              <a:t>Result</a:t>
+            </a:r>
+            <a:r>
+              <a:rPr lang="en-US" sz="1200" i="1" dirty="0">
+                <a:cs typeface="Calibri"/>
+              </a:rPr>
+              <a:t> </a:t>
+            </a:r>
+            <a:r>
+              <a:rPr lang="en-US" sz="1200" i="1" dirty="0"/>
+              <a:t>is a Xen VM</a:t>
+            </a:r>
+            <a:endParaRPr lang="en-US" dirty="0">
+              <a:cs typeface="Calibri"/>
+            </a:endParaRPr>
           </a:p>
         </p:txBody>
       </p:sp>
@@ -6773,8 +7081,8 @@
         </p:nvCxnSpPr>
         <p:spPr>
           <a:xfrm flipH="1">
-            <a:off x="4677740" y="2630847"/>
-            <a:ext cx="475341" cy="559590"/>
+            <a:off x="4677746" y="2446181"/>
+            <a:ext cx="427021" cy="744256"/>
           </a:xfrm>
           <a:prstGeom prst="straightConnector1">
             <a:avLst/>
@@ -6832,18 +7140,13 @@
           <a:lstStyle/>
           <a:p>
             <a:r>
-              <a:rPr lang="en-US" sz="1200" dirty="0" smtClean="0">
+              <a:rPr lang="en-US" sz="1200" dirty="0">
                 <a:solidFill>
                   <a:schemeClr val="accent2"/>
                 </a:solidFill>
               </a:rPr>
               <a:t>Per-application Dockerfile</a:t>
             </a:r>
-            <a:endParaRPr lang="en-US" sz="1200" dirty="0">
-              <a:solidFill>
-                <a:schemeClr val="accent2"/>
-              </a:solidFill>
-            </a:endParaRPr>
           </a:p>
         </p:txBody>
       </p:sp>
@@ -6881,18 +7184,13 @@
           <a:lstStyle/>
           <a:p>
             <a:r>
-              <a:rPr lang="en-US" sz="1200" dirty="0" smtClean="0">
+              <a:rPr lang="en-US" sz="1200" dirty="0">
                 <a:solidFill>
                   <a:schemeClr val="accent2"/>
                 </a:solidFill>
               </a:rPr>
               <a:t>Per-application Dockerfile</a:t>
             </a:r>
-            <a:endParaRPr lang="en-US" sz="1200" dirty="0">
-              <a:solidFill>
-                <a:schemeClr val="accent2"/>
-              </a:solidFill>
-            </a:endParaRPr>
           </a:p>
         </p:txBody>
       </p:sp>
@@ -6930,18 +7228,13 @@
           <a:lstStyle/>
           <a:p>
             <a:r>
-              <a:rPr lang="en-US" sz="1200" dirty="0" smtClean="0">
+              <a:rPr lang="en-US" sz="1200" dirty="0">
                 <a:solidFill>
                   <a:schemeClr val="accent2"/>
                 </a:solidFill>
               </a:rPr>
               <a:t>Per-application Dockerfile</a:t>
             </a:r>
-            <a:endParaRPr lang="en-US" sz="1200" dirty="0">
-              <a:solidFill>
-                <a:schemeClr val="accent2"/>
-              </a:solidFill>
-            </a:endParaRPr>
           </a:p>
         </p:txBody>
       </p:sp>
@@ -7086,17 +7379,16 @@
           <a:p>
             <a:pPr algn="ctr"/>
             <a:r>
-              <a:rPr lang="en-US" sz="1200" dirty="0" smtClean="0"/>
+              <a:rPr lang="en-US" sz="1200" dirty="0"/>
               <a:t>WINE</a:t>
             </a:r>
             <a:br>
-              <a:rPr lang="en-US" sz="1200" dirty="0" smtClean="0"/>
+              <a:rPr lang="en-US" sz="1200" dirty="0"/>
             </a:br>
             <a:r>
-              <a:rPr lang="en-US" sz="1200" dirty="0" smtClean="0"/>
+              <a:rPr lang="en-US" sz="1200" dirty="0"/>
               <a:t>Patches</a:t>
             </a:r>
-            <a:endParaRPr lang="en-US" sz="1200" dirty="0"/>
           </a:p>
         </p:txBody>
       </p:sp>
@@ -7135,17 +7427,16 @@
           <a:p>
             <a:pPr algn="ctr"/>
             <a:r>
-              <a:rPr lang="en-US" sz="1200" dirty="0" smtClean="0"/>
+              <a:rPr lang="en-US" sz="1200" dirty="0"/>
               <a:t>Instrumented</a:t>
             </a:r>
             <a:br>
-              <a:rPr lang="en-US" sz="1200" dirty="0" smtClean="0"/>
+              <a:rPr lang="en-US" sz="1200" dirty="0"/>
             </a:br>
             <a:r>
-              <a:rPr lang="en-US" sz="1200" dirty="0" smtClean="0"/>
+              <a:rPr lang="en-US" sz="1200" dirty="0"/>
               <a:t>WINE</a:t>
             </a:r>
-            <a:endParaRPr lang="en-US" sz="1200" dirty="0"/>
           </a:p>
         </p:txBody>
       </p:sp>
@@ -7184,10 +7475,9 @@
           <a:p>
             <a:pPr algn="ctr"/>
             <a:r>
-              <a:rPr lang="en-US" sz="1200" dirty="0" smtClean="0"/>
+              <a:rPr lang="en-US" sz="1200" dirty="0"/>
               <a:t>Upstream WINE Src</a:t>
             </a:r>
-            <a:endParaRPr lang="en-US" sz="1200" dirty="0"/>
           </a:p>
         </p:txBody>
       </p:sp>
@@ -7318,7 +7608,7 @@
 </p:sld>
 </file>
 
-<file path=ppt/slides/slide4.xml><?xml version="1.0" encoding="utf-8"?>
+<file path=ppt/slides/slide5.xml><?xml version="1.0" encoding="utf-8"?>
 <p:sld xmlns:a="http://schemas.openxmlformats.org/drawingml/2006/main" xmlns:r="http://schemas.openxmlformats.org/officeDocument/2006/relationships" xmlns:p="http://schemas.openxmlformats.org/presentationml/2006/main">
   <p:cSld>
     <p:spTree>
@@ -7373,10 +7663,9 @@
           <a:p>
             <a:pPr algn="ctr"/>
             <a:r>
-              <a:rPr lang="en-US" i="1" dirty="0" smtClean="0"/>
+              <a:rPr lang="en-US" i="1" dirty="0"/>
               <a:t>Building Excalibur</a:t>
             </a:r>
-            <a:endParaRPr lang="en-US" i="1" dirty="0"/>
           </a:p>
         </p:txBody>
       </p:sp>
@@ -7418,10 +7707,9 @@
           <a:p>
             <a:pPr algn="ctr"/>
             <a:r>
-              <a:rPr lang="en-US" i="1" dirty="0" smtClean="0"/>
+              <a:rPr lang="en-US" i="1" dirty="0"/>
               <a:t>Building Valor</a:t>
             </a:r>
-            <a:endParaRPr lang="en-US" i="1" dirty="0"/>
           </a:p>
         </p:txBody>
       </p:sp>
@@ -7449,13 +7737,8 @@
           <a:p>
             <a:r>
               <a:rPr lang="en-US" sz="3600" dirty="0"/>
-              <a:t>Construct the </a:t>
-            </a:r>
-            <a:r>
-              <a:rPr lang="en-US" sz="3600" dirty="0" smtClean="0"/>
-              <a:t>Galahad Components, Continued</a:t>
-            </a:r>
-            <a:endParaRPr lang="en-US" sz="3600" dirty="0"/>
+              <a:t>Construct the Galahad Components, Continued</a:t>
+            </a:r>
           </a:p>
         </p:txBody>
       </p:sp>
@@ -7483,7 +7766,7 @@
           <a:p>
             <a:pPr algn="ctr"/>
             <a:r>
-              <a:rPr lang="en-US" sz="23900" b="1" cap="none" spc="0" dirty="0" smtClean="0">
+              <a:rPr lang="en-US" sz="23900" b="1" cap="none" spc="0" dirty="0">
                 <a:ln w="12700">
                   <a:solidFill>
                     <a:schemeClr val="accent5"/>
@@ -7505,26 +7788,6 @@
               </a:rPr>
               <a:t>?</a:t>
             </a:r>
-            <a:endParaRPr lang="en-US" sz="23900" b="1" cap="none" spc="0" dirty="0">
-              <a:ln w="12700">
-                <a:solidFill>
-                  <a:schemeClr val="accent5"/>
-                </a:solidFill>
-                <a:prstDash val="solid"/>
-              </a:ln>
-              <a:pattFill prst="ltDnDiag">
-                <a:fgClr>
-                  <a:schemeClr val="accent5">
-                    <a:lumMod val="60000"/>
-                    <a:lumOff val="40000"/>
-                  </a:schemeClr>
-                </a:fgClr>
-                <a:bgClr>
-                  <a:schemeClr val="bg1"/>
-                </a:bgClr>
-              </a:pattFill>
-              <a:effectLst/>
-            </a:endParaRPr>
           </a:p>
         </p:txBody>
       </p:sp>
@@ -7563,10 +7826,9 @@
           <a:p>
             <a:pPr algn="ctr"/>
             <a:r>
-              <a:rPr lang="en-US" sz="1200" dirty="0" smtClean="0"/>
+              <a:rPr lang="en-US" sz="1200" dirty="0"/>
               <a:t>Upstream Kernel Src</a:t>
             </a:r>
-            <a:endParaRPr lang="en-US" sz="1200" dirty="0"/>
           </a:p>
         </p:txBody>
       </p:sp>
@@ -7605,10 +7867,9 @@
           <a:p>
             <a:pPr algn="ctr"/>
             <a:r>
-              <a:rPr lang="en-US" sz="1200" dirty="0" smtClean="0"/>
+              <a:rPr lang="en-US" sz="1200" dirty="0"/>
               <a:t>Upstream Xen Src</a:t>
             </a:r>
-            <a:endParaRPr lang="en-US" sz="1200" dirty="0"/>
           </a:p>
         </p:txBody>
       </p:sp>
@@ -7647,10 +7908,9 @@
           <a:p>
             <a:pPr algn="ctr"/>
             <a:r>
-              <a:rPr lang="en-US" sz="1200" dirty="0" smtClean="0"/>
+              <a:rPr lang="en-US" sz="1200" dirty="0"/>
               <a:t>Galahad XenBlanket Patches</a:t>
             </a:r>
-            <a:endParaRPr lang="en-US" sz="1200" dirty="0"/>
           </a:p>
         </p:txBody>
       </p:sp>
@@ -7689,10 +7949,9 @@
           <a:p>
             <a:pPr algn="ctr"/>
             <a:r>
-              <a:rPr lang="en-US" sz="1200" dirty="0" smtClean="0"/>
+              <a:rPr lang="en-US" sz="1200" dirty="0"/>
               <a:t>XenBlanket Kernel Patches</a:t>
             </a:r>
-            <a:endParaRPr lang="en-US" sz="1200" dirty="0"/>
           </a:p>
         </p:txBody>
       </p:sp>
@@ -7731,7 +7990,7 @@
           <a:p>
             <a:pPr algn="ctr"/>
             <a:r>
-              <a:rPr lang="en-US" sz="1200" dirty="0" smtClean="0"/>
+              <a:rPr lang="en-US" sz="1200" dirty="0"/>
               <a:t>Xen HV with XenBlanket Support</a:t>
             </a:r>
           </a:p>
@@ -7846,7 +8105,7 @@
           <a:p>
             <a:pPr algn="ctr"/>
             <a:r>
-              <a:rPr lang="en-US" sz="1200" dirty="0" smtClean="0"/>
+              <a:rPr lang="en-US" sz="1200" dirty="0"/>
               <a:t>Kernel .DEB with XenBlanket Support</a:t>
             </a:r>
           </a:p>
@@ -7959,10 +8218,9 @@
           <a:p>
             <a:pPr algn="ctr"/>
             <a:r>
-              <a:rPr lang="en-US" sz="1200" dirty="0" smtClean="0"/>
+              <a:rPr lang="en-US" sz="1200" dirty="0"/>
               <a:t>Open vSwitch</a:t>
             </a:r>
-            <a:endParaRPr lang="en-US" sz="1200" dirty="0"/>
           </a:p>
         </p:txBody>
       </p:sp>
@@ -8001,10 +8259,9 @@
           <a:p>
             <a:pPr algn="ctr"/>
             <a:r>
-              <a:rPr lang="en-US" sz="1200" dirty="0" smtClean="0"/>
+              <a:rPr lang="en-US" sz="1200" dirty="0"/>
               <a:t>Router Config</a:t>
             </a:r>
-            <a:endParaRPr lang="en-US" sz="1200" dirty="0"/>
           </a:p>
         </p:txBody>
       </p:sp>
@@ -8048,10 +8305,9 @@
           <a:p>
             <a:pPr algn="ctr"/>
             <a:r>
-              <a:rPr lang="en-US" dirty="0" smtClean="0"/>
+              <a:rPr lang="en-US" dirty="0"/>
               <a:t>XenBlanket AMI</a:t>
             </a:r>
-            <a:endParaRPr lang="en-US" dirty="0"/>
           </a:p>
         </p:txBody>
       </p:sp>
@@ -8092,10 +8348,9 @@
           <a:p>
             <a:pPr algn="ctr"/>
             <a:r>
-              <a:rPr lang="en-US" dirty="0" smtClean="0"/>
+              <a:rPr lang="en-US" dirty="0"/>
               <a:t>EFS</a:t>
             </a:r>
-            <a:endParaRPr lang="en-US" dirty="0"/>
           </a:p>
         </p:txBody>
       </p:sp>
@@ -8313,17 +8568,16 @@
           <a:p>
             <a:pPr algn="ctr"/>
             <a:r>
-              <a:rPr lang="en-US" sz="1200" dirty="0" smtClean="0"/>
+              <a:rPr lang="en-US" sz="1200" dirty="0"/>
               <a:t>Compute</a:t>
             </a:r>
             <a:br>
-              <a:rPr lang="en-US" sz="1200" dirty="0" smtClean="0"/>
+              <a:rPr lang="en-US" sz="1200" dirty="0"/>
             </a:br>
             <a:r>
-              <a:rPr lang="en-US" sz="1200" dirty="0" smtClean="0"/>
+              <a:rPr lang="en-US" sz="1200" dirty="0"/>
               <a:t>Config</a:t>
             </a:r>
-            <a:endParaRPr lang="en-US" sz="1200" dirty="0"/>
           </a:p>
         </p:txBody>
       </p:sp>
@@ -8405,10 +8659,9 @@
           <a:p>
             <a:pPr algn="ctr"/>
             <a:r>
-              <a:rPr lang="en-US" sz="1400" dirty="0" smtClean="0"/>
+              <a:rPr lang="en-US" sz="1400" dirty="0"/>
               <a:t>Open vSwitch AMI</a:t>
             </a:r>
-            <a:endParaRPr lang="en-US" sz="1400" dirty="0"/>
           </a:p>
         </p:txBody>
       </p:sp>
@@ -8483,10 +8736,9 @@
           <a:p>
             <a:pPr algn="ctr"/>
             <a:r>
-              <a:rPr lang="en-US" sz="900" dirty="0" smtClean="0"/>
+              <a:rPr lang="en-US" sz="900" dirty="0"/>
               <a:t>Alex’s best guess at the current process</a:t>
             </a:r>
-            <a:endParaRPr lang="en-US" sz="900" dirty="0"/>
           </a:p>
         </p:txBody>
       </p:sp>
@@ -8503,7 +8755,7 @@
 </p:sld>
 </file>
 
-<file path=ppt/slides/slide5.xml><?xml version="1.0" encoding="utf-8"?>
+<file path=ppt/slides/slide6.xml><?xml version="1.0" encoding="utf-8"?>
 <p:sld xmlns:a="http://schemas.openxmlformats.org/drawingml/2006/main" xmlns:r="http://schemas.openxmlformats.org/officeDocument/2006/relationships" xmlns:p="http://schemas.openxmlformats.org/presentationml/2006/main">
   <p:cSld>
     <p:spTree>
@@ -9785,7 +10037,7 @@
           <p:cNvPr id="33" name="Up Arrow 32">
             <a:extLst>
               <a:ext uri="{FF2B5EF4-FFF2-40B4-BE49-F238E27FC236}">
-                <a16:creationId xmlns="" xmlns:a16="http://schemas.microsoft.com/office/drawing/2014/main" id="{370B8064-3C16-4845-9311-2DF48E71FD7F}"/>
+                <a16:creationId xmlns:a16="http://schemas.microsoft.com/office/drawing/2014/main" id="{370B8064-3C16-4845-9311-2DF48E71FD7F}"/>
               </a:ext>
             </a:extLst>
           </p:cNvPr>
@@ -9831,7 +10083,7 @@
           <p:cNvPr id="43" name="Rectangle 42">
             <a:extLst>
               <a:ext uri="{FF2B5EF4-FFF2-40B4-BE49-F238E27FC236}">
-                <a16:creationId xmlns="" xmlns:a16="http://schemas.microsoft.com/office/drawing/2014/main" id="{6063983B-D80C-D346-9F1A-D34029996D70}"/>
+                <a16:creationId xmlns:a16="http://schemas.microsoft.com/office/drawing/2014/main" id="{6063983B-D80C-D346-9F1A-D34029996D70}"/>
               </a:ext>
             </a:extLst>
           </p:cNvPr>
@@ -9885,7 +10137,7 @@
           <p:cNvPr id="44" name="Up Arrow 43">
             <a:extLst>
               <a:ext uri="{FF2B5EF4-FFF2-40B4-BE49-F238E27FC236}">
-                <a16:creationId xmlns="" xmlns:a16="http://schemas.microsoft.com/office/drawing/2014/main" id="{0412FE75-E459-FC47-9C5F-4AD428F04400}"/>
+                <a16:creationId xmlns:a16="http://schemas.microsoft.com/office/drawing/2014/main" id="{0412FE75-E459-FC47-9C5F-4AD428F04400}"/>
               </a:ext>
             </a:extLst>
           </p:cNvPr>
@@ -9961,24 +10213,23 @@
           <a:p>
             <a:pPr algn="ctr"/>
             <a:r>
-              <a:rPr lang="en-US" sz="1400" dirty="0" smtClean="0"/>
+              <a:rPr lang="en-US" sz="1400" dirty="0"/>
               <a:t>Static</a:t>
             </a:r>
             <a:br>
-              <a:rPr lang="en-US" sz="1400" dirty="0" smtClean="0"/>
+              <a:rPr lang="en-US" sz="1400" dirty="0"/>
             </a:br>
             <a:r>
-              <a:rPr lang="en-US" sz="1400" dirty="0" smtClean="0"/>
+              <a:rPr lang="en-US" sz="1400" dirty="0"/>
               <a:t>Configuration</a:t>
             </a:r>
             <a:br>
-              <a:rPr lang="en-US" sz="1400" dirty="0" smtClean="0"/>
+              <a:rPr lang="en-US" sz="1400" dirty="0"/>
             </a:br>
             <a:r>
-              <a:rPr lang="en-US" sz="1400" dirty="0" smtClean="0"/>
+              <a:rPr lang="en-US" sz="1400" dirty="0"/>
               <a:t>Data</a:t>
             </a:r>
-            <a:endParaRPr lang="en-US" sz="1400" dirty="0"/>
           </a:p>
         </p:txBody>
       </p:sp>
@@ -10033,7 +10284,7 @@
 </p:sld>
 </file>
 
-<file path=ppt/slides/slide6.xml><?xml version="1.0" encoding="utf-8"?>
+<file path=ppt/slides/slide7.xml><?xml version="1.0" encoding="utf-8"?>
 <p:sld xmlns:a="http://schemas.openxmlformats.org/drawingml/2006/main" xmlns:r="http://schemas.openxmlformats.org/officeDocument/2006/relationships" xmlns:p="http://schemas.openxmlformats.org/presentationml/2006/main">
   <p:cSld>
     <p:spTree>
@@ -10066,10 +10317,9 @@
           <a:lstStyle/>
           <a:p>
             <a:r>
-              <a:rPr lang="en-US" dirty="0" smtClean="0"/>
+              <a:rPr lang="en-US" dirty="0"/>
               <a:t>Provisioning the Galahad System</a:t>
             </a:r>
-            <a:endParaRPr lang="en-US" dirty="0"/>
           </a:p>
         </p:txBody>
       </p:sp>
@@ -10110,10 +10360,9 @@
           <a:p>
             <a:pPr algn="ctr"/>
             <a:r>
-              <a:rPr lang="en-US" dirty="0" smtClean="0"/>
+              <a:rPr lang="en-US" dirty="0"/>
               <a:t>CloudFormation Script</a:t>
             </a:r>
-            <a:endParaRPr lang="en-US" dirty="0"/>
           </a:p>
         </p:txBody>
       </p:sp>
@@ -10157,10 +10406,9 @@
           <a:p>
             <a:pPr algn="ctr"/>
             <a:r>
-              <a:rPr lang="en-US" sz="1400" dirty="0" smtClean="0"/>
+              <a:rPr lang="en-US" sz="1400" dirty="0"/>
               <a:t>AWS CloudFormation</a:t>
             </a:r>
-            <a:endParaRPr lang="en-US" sz="1400" dirty="0"/>
           </a:p>
         </p:txBody>
       </p:sp>
@@ -10199,17 +10447,16 @@
           <a:p>
             <a:pPr algn="ctr"/>
             <a:r>
-              <a:rPr lang="en-US" dirty="0" smtClean="0"/>
+              <a:rPr lang="en-US" dirty="0"/>
               <a:t>Galahad</a:t>
             </a:r>
           </a:p>
           <a:p>
             <a:pPr algn="ctr"/>
             <a:r>
-              <a:rPr lang="en-US" sz="1200" i="1" dirty="0" smtClean="0"/>
+              <a:rPr lang="en-US" sz="1200" i="1" dirty="0"/>
               <a:t>(Excalibur, Infrastructure parts, multiple Valor instances, and EFS mount holding Unity images)</a:t>
             </a:r>
-            <a:endParaRPr lang="en-US" sz="1200" i="1" dirty="0"/>
           </a:p>
         </p:txBody>
       </p:sp>
@@ -10264,10 +10511,9 @@
             <a:p>
               <a:pPr algn="ctr"/>
               <a:r>
-                <a:rPr lang="en-US" dirty="0" smtClean="0"/>
+                <a:rPr lang="en-US" dirty="0"/>
                 <a:t>EFS</a:t>
               </a:r>
-              <a:endParaRPr lang="en-US" dirty="0"/>
             </a:p>
           </p:txBody>
         </p:sp>
@@ -10422,10 +10668,9 @@
             <a:p>
               <a:pPr algn="ctr"/>
               <a:r>
-                <a:rPr lang="en-US" sz="1400" dirty="0" smtClean="0"/>
+                <a:rPr lang="en-US" sz="1400" dirty="0"/>
                 <a:t>Valor AMI</a:t>
               </a:r>
-              <a:endParaRPr lang="en-US" sz="1400" dirty="0"/>
             </a:p>
           </p:txBody>
         </p:sp>
@@ -10469,10 +10714,9 @@
             <a:p>
               <a:pPr algn="ctr"/>
               <a:r>
-                <a:rPr lang="en-US" sz="1400" dirty="0" smtClean="0"/>
+                <a:rPr lang="en-US" sz="1400" dirty="0"/>
                 <a:t>Open vSwitch AMI</a:t>
               </a:r>
-              <a:endParaRPr lang="en-US" sz="1400" dirty="0"/>
             </a:p>
           </p:txBody>
         </p:sp>
@@ -10511,10 +10755,9 @@
             <a:p>
               <a:pPr algn="ctr"/>
               <a:r>
-                <a:rPr lang="en-US" sz="1400" dirty="0" smtClean="0"/>
+                <a:rPr lang="en-US" sz="1400" dirty="0"/>
                 <a:t>Excalibur AMI</a:t>
               </a:r>
-              <a:endParaRPr lang="en-US" sz="1400" dirty="0"/>
             </a:p>
           </p:txBody>
         </p:sp>
@@ -10553,10 +10796,9 @@
             <a:p>
               <a:pPr algn="ctr"/>
               <a:r>
-                <a:rPr lang="en-US" sz="1400" dirty="0" smtClean="0"/>
+                <a:rPr lang="en-US" sz="1400" dirty="0"/>
                 <a:t>Aggregator AMI</a:t>
               </a:r>
-              <a:endParaRPr lang="en-US" sz="1400" dirty="0"/>
             </a:p>
           </p:txBody>
         </p:sp>
@@ -10595,10 +10837,9 @@
             <a:p>
               <a:pPr algn="ctr"/>
               <a:r>
-                <a:rPr lang="en-US" sz="1400" dirty="0" smtClean="0"/>
+                <a:rPr lang="en-US" sz="1400" dirty="0"/>
                 <a:t>RethinkDB AMI</a:t>
               </a:r>
-              <a:endParaRPr lang="en-US" sz="1400" dirty="0"/>
             </a:p>
           </p:txBody>
         </p:sp>
@@ -10703,10 +10944,9 @@
           <a:lstStyle/>
           <a:p>
             <a:r>
-              <a:rPr lang="en-US" sz="1050" i="1" dirty="0" smtClean="0"/>
+              <a:rPr lang="en-US" sz="1050" i="1" dirty="0"/>
               <a:t>Note that this integration point is where we should be able to version components, define the set of AMIs to use, etc.</a:t>
             </a:r>
-            <a:endParaRPr lang="en-US" sz="1050" i="1" dirty="0"/>
           </a:p>
         </p:txBody>
       </p:sp>
@@ -10768,10 +11008,9 @@
           <a:lstStyle/>
           <a:p>
             <a:r>
-              <a:rPr lang="en-US" sz="1050" i="1" dirty="0" smtClean="0"/>
+              <a:rPr lang="en-US" sz="1050" i="1" dirty="0"/>
               <a:t>Note that we currently do not have a mechanism to build AMIs from source code repositories other than the assembler…</a:t>
             </a:r>
-            <a:endParaRPr lang="en-US" sz="1050" i="1" dirty="0"/>
           </a:p>
         </p:txBody>
       </p:sp>
@@ -10788,7 +11027,7 @@
 </p:sld>
 </file>
 
-<file path=ppt/slides/slide7.xml><?xml version="1.0" encoding="utf-8"?>
+<file path=ppt/slides/slide8.xml><?xml version="1.0" encoding="utf-8"?>
 <p:sld xmlns:a="http://schemas.openxmlformats.org/drawingml/2006/main" xmlns:r="http://schemas.openxmlformats.org/officeDocument/2006/relationships" xmlns:p="http://schemas.openxmlformats.org/presentationml/2006/main">
   <p:cSld>
     <p:spTree>
@@ -10866,10 +11105,9 @@
           <a:lstStyle/>
           <a:p>
             <a:r>
-              <a:rPr lang="en-US" sz="3600" dirty="0" smtClean="0"/>
+              <a:rPr lang="en-US" sz="3600" dirty="0"/>
               <a:t>Provisioning a new Virtue instance within Galahad</a:t>
             </a:r>
-            <a:endParaRPr lang="en-US" sz="3600" dirty="0"/>
           </a:p>
         </p:txBody>
       </p:sp>
@@ -10897,24 +11135,23 @@
           <a:p>
             <a:pPr algn="ctr"/>
             <a:r>
-              <a:rPr lang="en-US" sz="2000" dirty="0" smtClean="0"/>
+              <a:rPr lang="en-US" sz="2000" dirty="0"/>
               <a:t>Virtue Role Image</a:t>
             </a:r>
           </a:p>
           <a:p>
             <a:pPr algn="ctr"/>
             <a:r>
-              <a:rPr lang="en-US" sz="1050" dirty="0" smtClean="0"/>
+              <a:rPr lang="en-US" sz="1050" dirty="0"/>
               <a:t>(Unity + app containers)</a:t>
             </a:r>
           </a:p>
           <a:p>
             <a:pPr algn="ctr"/>
             <a:r>
-              <a:rPr lang="en-US" sz="1050" i="1" dirty="0" smtClean="0"/>
+              <a:rPr lang="en-US" sz="1050" i="1" dirty="0"/>
               <a:t>Not yet running anywhere</a:t>
             </a:r>
-            <a:endParaRPr lang="en-US" sz="1050" i="1" dirty="0"/>
           </a:p>
         </p:txBody>
       </p:sp>
@@ -11199,10 +11436,9 @@
             <a:p>
               <a:pPr algn="ctr"/>
               <a:r>
-                <a:rPr lang="en-US" sz="1200" dirty="0" smtClean="0"/>
+                <a:rPr lang="en-US" sz="1200" dirty="0"/>
                 <a:t>Word</a:t>
               </a:r>
-              <a:endParaRPr lang="en-US" sz="1200" dirty="0"/>
             </a:p>
           </p:txBody>
         </p:sp>
@@ -11243,10 +11479,9 @@
             <a:p>
               <a:pPr algn="ctr"/>
               <a:r>
-                <a:rPr lang="en-US" sz="1200" dirty="0" smtClean="0"/>
+                <a:rPr lang="en-US" sz="1200" dirty="0"/>
                 <a:t>Excel</a:t>
               </a:r>
-              <a:endParaRPr lang="en-US" sz="1200" dirty="0"/>
             </a:p>
           </p:txBody>
         </p:sp>
@@ -11287,10 +11522,9 @@
             <a:p>
               <a:pPr algn="ctr"/>
               <a:r>
-                <a:rPr lang="en-US" sz="1200" dirty="0" smtClean="0"/>
+                <a:rPr lang="en-US" sz="1200" dirty="0"/>
                 <a:t>DB Explorer</a:t>
               </a:r>
-              <a:endParaRPr lang="en-US" sz="1200" dirty="0"/>
             </a:p>
           </p:txBody>
         </p:sp>
@@ -11372,17 +11606,16 @@
             <a:p>
               <a:pPr algn="r"/>
               <a:r>
-                <a:rPr lang="en-US" dirty="0" smtClean="0"/>
+                <a:rPr lang="en-US" dirty="0"/>
                 <a:t>Local Site</a:t>
               </a:r>
               <a:br>
-                <a:rPr lang="en-US" dirty="0" smtClean="0"/>
+                <a:rPr lang="en-US" dirty="0"/>
               </a:br>
               <a:r>
-                <a:rPr lang="en-US" dirty="0" smtClean="0"/>
+                <a:rPr lang="en-US" dirty="0"/>
                 <a:t>Administrator</a:t>
               </a:r>
-              <a:endParaRPr lang="en-US" dirty="0"/>
             </a:p>
           </p:txBody>
         </p:sp>
@@ -11462,10 +11695,9 @@
             <a:lstStyle/>
             <a:p>
               <a:r>
-                <a:rPr lang="en-US" dirty="0" smtClean="0"/>
+                <a:rPr lang="en-US" dirty="0"/>
                 <a:t>Joe User</a:t>
               </a:r>
-              <a:endParaRPr lang="en-US" dirty="0"/>
             </a:p>
           </p:txBody>
         </p:sp>
@@ -11507,10 +11739,9 @@
           <a:p>
             <a:pPr algn="ctr"/>
             <a:r>
-              <a:rPr lang="en-US" dirty="0" smtClean="0"/>
+              <a:rPr lang="en-US" dirty="0"/>
               <a:t>Excalibur</a:t>
             </a:r>
-            <a:endParaRPr lang="en-US" dirty="0"/>
           </a:p>
         </p:txBody>
       </p:sp>
@@ -11554,10 +11785,9 @@
           <a:p>
             <a:pPr algn="ctr"/>
             <a:r>
-              <a:rPr lang="en-US" sz="1400" dirty="0" smtClean="0"/>
+              <a:rPr lang="en-US" sz="1400" dirty="0"/>
               <a:t>Valor</a:t>
             </a:r>
-            <a:endParaRPr lang="en-US" sz="1400" dirty="0"/>
           </a:p>
         </p:txBody>
       </p:sp>
@@ -11601,10 +11831,9 @@
           <a:p>
             <a:pPr algn="ctr"/>
             <a:r>
-              <a:rPr lang="en-US" sz="1400" dirty="0" smtClean="0"/>
+              <a:rPr lang="en-US" sz="1400" dirty="0"/>
               <a:t>Valor</a:t>
             </a:r>
-            <a:endParaRPr lang="en-US" sz="1400" dirty="0"/>
           </a:p>
         </p:txBody>
       </p:sp>
@@ -11648,10 +11877,9 @@
           <a:p>
             <a:pPr algn="ctr"/>
             <a:r>
-              <a:rPr lang="en-US" sz="1400" dirty="0" smtClean="0"/>
+              <a:rPr lang="en-US" sz="1400" dirty="0"/>
               <a:t>Valor</a:t>
             </a:r>
-            <a:endParaRPr lang="en-US" sz="1400" dirty="0"/>
           </a:p>
         </p:txBody>
       </p:sp>
@@ -11695,10 +11923,9 @@
           <a:p>
             <a:pPr algn="ctr"/>
             <a:r>
-              <a:rPr lang="en-US" sz="1400" dirty="0" smtClean="0"/>
+              <a:rPr lang="en-US" sz="1400" dirty="0"/>
               <a:t>Valor</a:t>
             </a:r>
-            <a:endParaRPr lang="en-US" sz="1400" dirty="0"/>
           </a:p>
         </p:txBody>
       </p:sp>
@@ -11737,10 +11964,9 @@
           <a:p>
             <a:pPr algn="ctr"/>
             <a:r>
-              <a:rPr lang="en-US" dirty="0" smtClean="0"/>
+              <a:rPr lang="en-US" dirty="0"/>
               <a:t>Virtue Image Store</a:t>
             </a:r>
-            <a:endParaRPr lang="en-US" dirty="0"/>
           </a:p>
         </p:txBody>
       </p:sp>
@@ -11767,17 +11993,16 @@
           <a:lstStyle/>
           <a:p>
             <a:r>
-              <a:rPr lang="en-US" sz="1400" dirty="0" smtClean="0"/>
+              <a:rPr lang="en-US" sz="1400" dirty="0"/>
               <a:t>“Joe is a </a:t>
             </a:r>
             <a:br>
-              <a:rPr lang="en-US" sz="1400" dirty="0" smtClean="0"/>
+              <a:rPr lang="en-US" sz="1400" dirty="0"/>
             </a:br>
             <a:r>
-              <a:rPr lang="en-US" sz="1400" dirty="0" smtClean="0"/>
+              <a:rPr lang="en-US" sz="1400" dirty="0"/>
               <a:t>DocEditor”</a:t>
             </a:r>
-            <a:endParaRPr lang="en-US" sz="1400" dirty="0"/>
           </a:p>
         </p:txBody>
       </p:sp>
@@ -11845,10 +12070,9 @@
           <a:p>
             <a:pPr algn="ctr"/>
             <a:r>
-              <a:rPr lang="en-US" sz="1400" b="1" dirty="0" smtClean="0"/>
+              <a:rPr lang="en-US" sz="1400" b="1" dirty="0"/>
               <a:t>1</a:t>
             </a:r>
-            <a:endParaRPr lang="en-US" sz="1400" b="1" dirty="0"/>
           </a:p>
         </p:txBody>
       </p:sp>
@@ -11887,10 +12111,9 @@
           <a:p>
             <a:pPr algn="ctr"/>
             <a:r>
-              <a:rPr lang="en-US" dirty="0" smtClean="0"/>
+              <a:rPr lang="en-US" dirty="0"/>
               <a:t>LDAP</a:t>
             </a:r>
-            <a:endParaRPr lang="en-US" dirty="0"/>
           </a:p>
         </p:txBody>
       </p:sp>
@@ -11917,17 +12140,16 @@
           <a:lstStyle/>
           <a:p>
             <a:r>
-              <a:rPr lang="en-US" sz="1400" dirty="0" smtClean="0"/>
+              <a:rPr lang="en-US" sz="1400" dirty="0"/>
               <a:t>“Create a DocEditor</a:t>
             </a:r>
             <a:br>
-              <a:rPr lang="en-US" sz="1400" dirty="0" smtClean="0"/>
+              <a:rPr lang="en-US" sz="1400" dirty="0"/>
             </a:br>
             <a:r>
-              <a:rPr lang="en-US" sz="1400" dirty="0" smtClean="0"/>
+              <a:rPr lang="en-US" sz="1400" dirty="0"/>
               <a:t>for Joe with keys ...”</a:t>
             </a:r>
-            <a:endParaRPr lang="en-US" sz="1400" dirty="0"/>
           </a:p>
         </p:txBody>
       </p:sp>
@@ -12081,10 +12303,9 @@
           <a:lstStyle/>
           <a:p>
             <a:r>
-              <a:rPr lang="en-US" sz="1400" dirty="0" smtClean="0"/>
+              <a:rPr lang="en-US" sz="1400" dirty="0"/>
               <a:t>Canvas does its thing</a:t>
             </a:r>
-            <a:endParaRPr lang="en-US" sz="1400" dirty="0"/>
           </a:p>
         </p:txBody>
       </p:sp>
@@ -12112,25 +12333,21 @@
           <a:p>
             <a:pPr algn="r"/>
             <a:r>
-              <a:rPr lang="en-US" sz="1400" dirty="0" smtClean="0"/>
+              <a:rPr lang="en-US" sz="1400" dirty="0"/>
               <a:t>“I am Joe and</a:t>
-            </a:r>
-            <a:br>
-              <a:rPr lang="en-US" sz="1400" dirty="0" smtClean="0"/>
-            </a:br>
-            <a:r>
-              <a:rPr lang="en-US" sz="1400" dirty="0" smtClean="0"/>
-              <a:t>I want to edit</a:t>
-            </a:r>
-            <a:r>
-              <a:rPr lang="en-US" sz="1400" dirty="0"/>
-              <a:t/>
             </a:r>
             <a:br>
               <a:rPr lang="en-US" sz="1400" dirty="0"/>
             </a:br>
             <a:r>
-              <a:rPr lang="en-US" sz="1400" dirty="0" smtClean="0"/>
+              <a:rPr lang="en-US" sz="1400" dirty="0"/>
+              <a:t>I want to edit</a:t>
+            </a:r>
+            <a:br>
+              <a:rPr lang="en-US" sz="1400" dirty="0"/>
+            </a:br>
+            <a:r>
+              <a:rPr lang="en-US" sz="1400" dirty="0"/>
               <a:t>documents”</a:t>
             </a:r>
           </a:p>
@@ -12176,10 +12393,9 @@
           <a:p>
             <a:pPr algn="ctr"/>
             <a:r>
-              <a:rPr lang="en-US" sz="1400" b="1" dirty="0" smtClean="0"/>
+              <a:rPr lang="en-US" sz="1400" b="1" dirty="0"/>
               <a:t>2</a:t>
             </a:r>
-            <a:endParaRPr lang="en-US" sz="1400" b="1" dirty="0"/>
           </a:p>
         </p:txBody>
       </p:sp>
@@ -12348,24 +12564,23 @@
           <a:lstStyle/>
           <a:p>
             <a:r>
-              <a:rPr lang="en-US" sz="1200" dirty="0" smtClean="0"/>
+              <a:rPr lang="en-US" sz="1200" dirty="0"/>
               <a:t>Load Dynamic</a:t>
             </a:r>
             <a:br>
-              <a:rPr lang="en-US" sz="1200" dirty="0" smtClean="0"/>
+              <a:rPr lang="en-US" sz="1200" dirty="0"/>
             </a:br>
             <a:r>
-              <a:rPr lang="en-US" sz="1200" dirty="0" smtClean="0"/>
+              <a:rPr lang="en-US" sz="1200" dirty="0"/>
               <a:t>Configuration</a:t>
             </a:r>
             <a:br>
-              <a:rPr lang="en-US" sz="1200" dirty="0" smtClean="0"/>
+              <a:rPr lang="en-US" sz="1200" dirty="0"/>
             </a:br>
             <a:r>
-              <a:rPr lang="en-US" sz="1200" dirty="0" smtClean="0"/>
+              <a:rPr lang="en-US" sz="1200" dirty="0"/>
               <a:t>Data</a:t>
             </a:r>
-            <a:endParaRPr lang="en-US" sz="1200" dirty="0"/>
           </a:p>
         </p:txBody>
       </p:sp>
@@ -12409,10 +12624,9 @@
           <a:p>
             <a:pPr algn="ctr"/>
             <a:r>
-              <a:rPr lang="en-US" sz="1400" b="1" dirty="0" smtClean="0"/>
+              <a:rPr lang="en-US" sz="1400" b="1" dirty="0"/>
               <a:t>3a</a:t>
             </a:r>
-            <a:endParaRPr lang="en-US" sz="1400" b="1" dirty="0"/>
           </a:p>
         </p:txBody>
       </p:sp>
@@ -12453,158 +12667,6 @@
     <p:extLst>
       <p:ext uri="{BB962C8B-B14F-4D97-AF65-F5344CB8AC3E}">
         <p14:creationId xmlns:p14="http://schemas.microsoft.com/office/powerpoint/2010/main" val="3267036169"/>
-      </p:ext>
-    </p:extLst>
-  </p:cSld>
-  <p:clrMapOvr>
-    <a:masterClrMapping/>
-  </p:clrMapOvr>
-</p:sld>
-</file>
-
-<file path=ppt/slides/slide8.xml><?xml version="1.0" encoding="utf-8"?>
-<p:sld xmlns:a="http://schemas.openxmlformats.org/drawingml/2006/main" xmlns:r="http://schemas.openxmlformats.org/officeDocument/2006/relationships" xmlns:p="http://schemas.openxmlformats.org/presentationml/2006/main">
-  <p:cSld>
-    <p:spTree>
-      <p:nvGrpSpPr>
-        <p:cNvPr id="1" name=""/>
-        <p:cNvGrpSpPr/>
-        <p:nvPr/>
-      </p:nvGrpSpPr>
-      <p:grpSpPr>
-        <a:xfrm>
-          <a:off x="0" y="0"/>
-          <a:ext cx="0" cy="0"/>
-          <a:chOff x="0" y="0"/>
-          <a:chExt cx="0" cy="0"/>
-        </a:xfrm>
-      </p:grpSpPr>
-      <p:sp>
-        <p:nvSpPr>
-          <p:cNvPr id="2" name="Title 1"/>
-          <p:cNvSpPr>
-            <a:spLocks noGrp="1"/>
-          </p:cNvSpPr>
-          <p:nvPr>
-            <p:ph type="title"/>
-          </p:nvPr>
-        </p:nvSpPr>
-        <p:spPr/>
-        <p:txBody>
-          <a:bodyPr/>
-          <a:lstStyle/>
-          <a:p>
-            <a:r>
-              <a:rPr lang="en-US" dirty="0" smtClean="0"/>
-              <a:t>Process</a:t>
-            </a:r>
-            <a:endParaRPr lang="en-US" dirty="0"/>
-          </a:p>
-        </p:txBody>
-      </p:sp>
-      <p:sp>
-        <p:nvSpPr>
-          <p:cNvPr id="3" name="Content Placeholder 2"/>
-          <p:cNvSpPr>
-            <a:spLocks noGrp="1"/>
-          </p:cNvSpPr>
-          <p:nvPr>
-            <p:ph idx="1"/>
-          </p:nvPr>
-        </p:nvSpPr>
-        <p:spPr/>
-        <p:txBody>
-          <a:bodyPr>
-            <a:normAutofit fontScale="92500" lnSpcReduction="10000"/>
-          </a:bodyPr>
-          <a:lstStyle/>
-          <a:p>
-            <a:r>
-              <a:rPr lang="en-US" dirty="0" smtClean="0"/>
-              <a:t>Build Components</a:t>
-            </a:r>
-          </a:p>
-          <a:p>
-            <a:pPr lvl="1"/>
-            <a:r>
-              <a:rPr lang="en-US" dirty="0" smtClean="0"/>
-              <a:t>[Done by Continuous Integration or a formal release process]</a:t>
-            </a:r>
-          </a:p>
-          <a:p>
-            <a:pPr lvl="1"/>
-            <a:r>
-              <a:rPr lang="en-US" dirty="0" smtClean="0"/>
-              <a:t>Base Unity Image</a:t>
-            </a:r>
-          </a:p>
-          <a:p>
-            <a:pPr lvl="1"/>
-            <a:r>
-              <a:rPr lang="en-US" dirty="0" smtClean="0"/>
-              <a:t>Per-application Docker containers</a:t>
-            </a:r>
-          </a:p>
-          <a:p>
-            <a:pPr lvl="1"/>
-            <a:r>
-              <a:rPr lang="en-US" dirty="0" smtClean="0"/>
-              <a:t>Valor hypervisor base image w/ dom0</a:t>
-            </a:r>
-          </a:p>
-          <a:p>
-            <a:r>
-              <a:rPr lang="en-US" dirty="0" smtClean="0"/>
-              <a:t>Create a Role</a:t>
-            </a:r>
-          </a:p>
-          <a:p>
-            <a:pPr lvl="1"/>
-            <a:r>
-              <a:rPr lang="en-US" dirty="0" smtClean="0"/>
-              <a:t>Administrator selects applications to include in the role, submits to Excalibur</a:t>
-            </a:r>
-          </a:p>
-          <a:p>
-            <a:pPr lvl="1"/>
-            <a:r>
-              <a:rPr lang="en-US" dirty="0" smtClean="0"/>
-              <a:t>Excalibur triggers Role Creation process</a:t>
-            </a:r>
-          </a:p>
-          <a:p>
-            <a:r>
-              <a:rPr lang="en-US" dirty="0" smtClean="0"/>
-              <a:t>Provision a Virtue Instance</a:t>
-            </a:r>
-          </a:p>
-          <a:p>
-            <a:pPr lvl="1"/>
-            <a:r>
-              <a:rPr lang="en-US" dirty="0" smtClean="0"/>
-              <a:t>Excalibur decides which Valor to use (somehow)</a:t>
-            </a:r>
-          </a:p>
-          <a:p>
-            <a:pPr lvl="1"/>
-            <a:r>
-              <a:rPr lang="en-US" dirty="0" smtClean="0"/>
-              <a:t>Spins up appropriate virtue</a:t>
-            </a:r>
-          </a:p>
-          <a:p>
-            <a:pPr lvl="1"/>
-            <a:r>
-              <a:rPr lang="en-US" dirty="0" smtClean="0"/>
-              <a:t>Inject credentials into containers</a:t>
-            </a:r>
-          </a:p>
-        </p:txBody>
-      </p:sp>
-    </p:spTree>
-    <p:extLst>
-      <p:ext uri="{BB962C8B-B14F-4D97-AF65-F5344CB8AC3E}">
-        <p14:creationId xmlns:p14="http://schemas.microsoft.com/office/powerpoint/2010/main" val="2006641893"/>
       </p:ext>
     </p:extLst>
   </p:cSld>
@@ -12647,10 +12709,9 @@
           <a:lstStyle/>
           <a:p>
             <a:r>
-              <a:rPr lang="en-US" dirty="0" smtClean="0"/>
-              <a:t>Modifications Proposed</a:t>
-            </a:r>
-            <a:endParaRPr lang="en-US" dirty="0"/>
+              <a:rPr lang="en-US" dirty="0"/>
+              <a:t>Process</a:t>
+            </a:r>
           </a:p>
         </p:txBody>
       </p:sp>
@@ -12667,117 +12728,96 @@
         <p:spPr/>
         <p:txBody>
           <a:bodyPr>
-            <a:normAutofit fontScale="85000" lnSpcReduction="20000"/>
+            <a:normAutofit fontScale="92500" lnSpcReduction="10000"/>
           </a:bodyPr>
           <a:lstStyle/>
           <a:p>
             <a:r>
-              <a:rPr lang="en-US" dirty="0" smtClean="0"/>
-              <a:t> Assembler needs to be overhauled</a:t>
+              <a:rPr lang="en-US" dirty="0"/>
+              <a:t>Build Components</a:t>
             </a:r>
           </a:p>
           <a:p>
             <a:pPr lvl="1"/>
             <a:r>
-              <a:rPr lang="en-US" dirty="0" smtClean="0"/>
-              <a:t>Split into two parts:</a:t>
-            </a:r>
-          </a:p>
-          <a:p>
-            <a:pPr lvl="2"/>
-            <a:r>
-              <a:rPr lang="en-US" dirty="0" smtClean="0"/>
-              <a:t>Construction</a:t>
-            </a:r>
-          </a:p>
-          <a:p>
-            <a:pPr lvl="3"/>
-            <a:r>
-              <a:rPr lang="en-US" dirty="0" smtClean="0"/>
-              <a:t>Build base Unity image and push to EFS (?)</a:t>
-            </a:r>
-          </a:p>
-          <a:p>
-            <a:pPr lvl="3"/>
-            <a:r>
-              <a:rPr lang="en-US" dirty="0" smtClean="0"/>
-              <a:t>Build Docker containers and push to CI or stable registry</a:t>
-            </a:r>
-          </a:p>
-          <a:p>
-            <a:pPr lvl="2"/>
-            <a:r>
-              <a:rPr lang="en-US" dirty="0" smtClean="0"/>
-              <a:t>Assembly</a:t>
-            </a:r>
-          </a:p>
-          <a:p>
-            <a:pPr lvl="3"/>
-            <a:r>
-              <a:rPr lang="en-US" dirty="0" smtClean="0"/>
-              <a:t>Build Virtue VM from base Unity image + Docker containers</a:t>
-            </a:r>
-          </a:p>
-          <a:p>
-            <a:pPr lvl="3"/>
-            <a:r>
-              <a:rPr lang="en-US" dirty="0" smtClean="0"/>
-              <a:t>Store Virtue VM somewhere convenient (EFS?)</a:t>
-            </a:r>
-          </a:p>
-          <a:p>
-            <a:r>
-              <a:rPr lang="en-US" dirty="0" smtClean="0"/>
-              <a:t>Need two different set of artifacts (Unity, Docker containers, Virtues)</a:t>
+              <a:rPr lang="en-US" dirty="0"/>
+              <a:t>[Done by Continuous Integration or a formal release process]</a:t>
             </a:r>
           </a:p>
           <a:p>
             <a:pPr lvl="1"/>
             <a:r>
-              <a:rPr lang="en-US" dirty="0" smtClean="0"/>
-              <a:t>“stable” – this is the last tagged release that we expect to work</a:t>
+              <a:rPr lang="en-US" dirty="0"/>
+              <a:t>Base Unity Image</a:t>
             </a:r>
           </a:p>
           <a:p>
             <a:pPr lvl="1"/>
             <a:r>
-              <a:rPr lang="en-US" dirty="0" smtClean="0"/>
-              <a:t>“dev” – this is the bleeding edge, built by CI</a:t>
-            </a:r>
-          </a:p>
-          <a:p>
-            <a:r>
-              <a:rPr lang="en-US" dirty="0" smtClean="0"/>
-              <a:t>Need to be able to mix stable and dev components during development</a:t>
-            </a:r>
-          </a:p>
-          <a:p>
-            <a:r>
-              <a:rPr lang="en-US" dirty="0" smtClean="0"/>
-              <a:t>Need two different EFS stores – one for construction/assembly, and one for provisioning to </a:t>
-            </a:r>
-            <a:r>
-              <a:rPr lang="en-US" dirty="0" err="1" smtClean="0"/>
-              <a:t>Valors</a:t>
-            </a:r>
-            <a:endParaRPr lang="en-US" dirty="0" smtClean="0"/>
-          </a:p>
-          <a:p>
-            <a:r>
-              <a:rPr lang="en-US" dirty="0" smtClean="0"/>
-              <a:t>Excalibur team is responsible for the provisioning workflow</a:t>
+              <a:rPr lang="en-US" dirty="0"/>
+              <a:t>Per-application Docker containers</a:t>
             </a:r>
           </a:p>
           <a:p>
             <a:pPr lvl="1"/>
-            <a:endParaRPr lang="en-US" dirty="0"/>
+            <a:r>
+              <a:rPr lang="en-US" dirty="0"/>
+              <a:t>Valor hypervisor base image w/ dom0</a:t>
+            </a:r>
+          </a:p>
+          <a:p>
+            <a:r>
+              <a:rPr lang="en-US" dirty="0"/>
+              <a:t>Create a Role</a:t>
+            </a:r>
+          </a:p>
+          <a:p>
+            <a:pPr lvl="1"/>
+            <a:r>
+              <a:rPr lang="en-US" dirty="0"/>
+              <a:t>Administrator selects applications to include in the role, submits to Excalibur</a:t>
+            </a:r>
+          </a:p>
+          <a:p>
+            <a:pPr lvl="1"/>
+            <a:r>
+              <a:rPr lang="en-US" dirty="0"/>
+              <a:t>Excalibur triggers Role Creation process</a:t>
+            </a:r>
+          </a:p>
+          <a:p>
+            <a:r>
+              <a:rPr lang="en-US" dirty="0"/>
+              <a:t>Provision a Virtue Instance</a:t>
+            </a:r>
+          </a:p>
+          <a:p>
+            <a:pPr lvl="1"/>
+            <a:r>
+              <a:rPr lang="en-US" dirty="0"/>
+              <a:t>Excalibur decides which Valor to use (somehow)</a:t>
+            </a:r>
+          </a:p>
+          <a:p>
+            <a:pPr lvl="1"/>
+            <a:r>
+              <a:rPr lang="en-US" dirty="0"/>
+              <a:t>Spins up appropriate virtue</a:t>
+            </a:r>
+          </a:p>
+          <a:p>
+            <a:pPr lvl="1"/>
+            <a:r>
+              <a:rPr lang="en-US" dirty="0"/>
+              <a:t>Inject credentials into containers</a:t>
+            </a:r>
           </a:p>
         </p:txBody>
       </p:sp>
     </p:spTree>
     <p:extLst>
       <p:ext uri="{BB962C8B-B14F-4D97-AF65-F5344CB8AC3E}">
-        <p14:creationId xmlns:p14="http://schemas.microsoft.com/office/powerpoint/2010/main" val="3407547357"/>
+        <p14:creationId xmlns:p14="http://schemas.microsoft.com/office/powerpoint/2010/main" val="2006641893"/>
       </p:ext>
     </p:extLst>
   </p:cSld>

</xml_diff>